<commit_message>
Text Summarization, GPT API
</commit_message>
<xml_diff>
--- a/Final_pjt2/Infra_Pipeline.pptx
+++ b/Final_pjt2/Infra_Pipeline.pptx
@@ -261,7 +261,7 @@
           <a:p>
             <a:fld id="{F4D0D417-D880-4BB4-B0FA-3563BBBF0335}" type="datetimeFigureOut">
               <a:rPr lang="ko-KR" altLang="en-US" smtClean="0"/>
-              <a:t>2023-12-06</a:t>
+              <a:t>2023-12-07</a:t>
             </a:fld>
             <a:endParaRPr lang="ko-KR" altLang="en-US"/>
           </a:p>
@@ -459,7 +459,7 @@
           <a:p>
             <a:fld id="{F4D0D417-D880-4BB4-B0FA-3563BBBF0335}" type="datetimeFigureOut">
               <a:rPr lang="ko-KR" altLang="en-US" smtClean="0"/>
-              <a:t>2023-12-06</a:t>
+              <a:t>2023-12-07</a:t>
             </a:fld>
             <a:endParaRPr lang="ko-KR" altLang="en-US"/>
           </a:p>
@@ -667,7 +667,7 @@
           <a:p>
             <a:fld id="{F4D0D417-D880-4BB4-B0FA-3563BBBF0335}" type="datetimeFigureOut">
               <a:rPr lang="ko-KR" altLang="en-US" smtClean="0"/>
-              <a:t>2023-12-06</a:t>
+              <a:t>2023-12-07</a:t>
             </a:fld>
             <a:endParaRPr lang="ko-KR" altLang="en-US"/>
           </a:p>
@@ -865,7 +865,7 @@
           <a:p>
             <a:fld id="{F4D0D417-D880-4BB4-B0FA-3563BBBF0335}" type="datetimeFigureOut">
               <a:rPr lang="ko-KR" altLang="en-US" smtClean="0"/>
-              <a:t>2023-12-06</a:t>
+              <a:t>2023-12-07</a:t>
             </a:fld>
             <a:endParaRPr lang="ko-KR" altLang="en-US"/>
           </a:p>
@@ -1140,7 +1140,7 @@
           <a:p>
             <a:fld id="{F4D0D417-D880-4BB4-B0FA-3563BBBF0335}" type="datetimeFigureOut">
               <a:rPr lang="ko-KR" altLang="en-US" smtClean="0"/>
-              <a:t>2023-12-06</a:t>
+              <a:t>2023-12-07</a:t>
             </a:fld>
             <a:endParaRPr lang="ko-KR" altLang="en-US"/>
           </a:p>
@@ -1405,7 +1405,7 @@
           <a:p>
             <a:fld id="{F4D0D417-D880-4BB4-B0FA-3563BBBF0335}" type="datetimeFigureOut">
               <a:rPr lang="ko-KR" altLang="en-US" smtClean="0"/>
-              <a:t>2023-12-06</a:t>
+              <a:t>2023-12-07</a:t>
             </a:fld>
             <a:endParaRPr lang="ko-KR" altLang="en-US"/>
           </a:p>
@@ -1817,7 +1817,7 @@
           <a:p>
             <a:fld id="{F4D0D417-D880-4BB4-B0FA-3563BBBF0335}" type="datetimeFigureOut">
               <a:rPr lang="ko-KR" altLang="en-US" smtClean="0"/>
-              <a:t>2023-12-06</a:t>
+              <a:t>2023-12-07</a:t>
             </a:fld>
             <a:endParaRPr lang="ko-KR" altLang="en-US"/>
           </a:p>
@@ -1958,7 +1958,7 @@
           <a:p>
             <a:fld id="{F4D0D417-D880-4BB4-B0FA-3563BBBF0335}" type="datetimeFigureOut">
               <a:rPr lang="ko-KR" altLang="en-US" smtClean="0"/>
-              <a:t>2023-12-06</a:t>
+              <a:t>2023-12-07</a:t>
             </a:fld>
             <a:endParaRPr lang="ko-KR" altLang="en-US"/>
           </a:p>
@@ -2071,7 +2071,7 @@
           <a:p>
             <a:fld id="{F4D0D417-D880-4BB4-B0FA-3563BBBF0335}" type="datetimeFigureOut">
               <a:rPr lang="ko-KR" altLang="en-US" smtClean="0"/>
-              <a:t>2023-12-06</a:t>
+              <a:t>2023-12-07</a:t>
             </a:fld>
             <a:endParaRPr lang="ko-KR" altLang="en-US"/>
           </a:p>
@@ -2382,7 +2382,7 @@
           <a:p>
             <a:fld id="{F4D0D417-D880-4BB4-B0FA-3563BBBF0335}" type="datetimeFigureOut">
               <a:rPr lang="ko-KR" altLang="en-US" smtClean="0"/>
-              <a:t>2023-12-06</a:t>
+              <a:t>2023-12-07</a:t>
             </a:fld>
             <a:endParaRPr lang="ko-KR" altLang="en-US"/>
           </a:p>
@@ -2670,7 +2670,7 @@
           <a:p>
             <a:fld id="{F4D0D417-D880-4BB4-B0FA-3563BBBF0335}" type="datetimeFigureOut">
               <a:rPr lang="ko-KR" altLang="en-US" smtClean="0"/>
-              <a:t>2023-12-06</a:t>
+              <a:t>2023-12-07</a:t>
             </a:fld>
             <a:endParaRPr lang="ko-KR" altLang="en-US"/>
           </a:p>
@@ -2911,7 +2911,7 @@
           <a:p>
             <a:fld id="{F4D0D417-D880-4BB4-B0FA-3563BBBF0335}" type="datetimeFigureOut">
               <a:rPr lang="ko-KR" altLang="en-US" smtClean="0"/>
-              <a:t>2023-12-06</a:t>
+              <a:t>2023-12-07</a:t>
             </a:fld>
             <a:endParaRPr lang="ko-KR" altLang="en-US"/>
           </a:p>
@@ -8466,7 +8466,7 @@
         </p:nvGrpSpPr>
         <p:grpSpPr>
           <a:xfrm>
-            <a:off x="409889" y="2725851"/>
+            <a:off x="0" y="2400367"/>
             <a:ext cx="1506538" cy="689870"/>
             <a:chOff x="634119" y="3078325"/>
             <a:chExt cx="1506538" cy="689870"/>
@@ -8586,10 +8586,10 @@
         </p:nvGrpSpPr>
         <p:grpSpPr>
           <a:xfrm>
-            <a:off x="2317774" y="572593"/>
-            <a:ext cx="8711068" cy="5700553"/>
-            <a:chOff x="-5041210" y="-504512"/>
-            <a:chExt cx="8293269" cy="5567440"/>
+            <a:off x="3040525" y="198649"/>
+            <a:ext cx="6606976" cy="6456795"/>
+            <a:chOff x="-4164368" y="-411481"/>
+            <a:chExt cx="6290094" cy="6306026"/>
           </a:xfrm>
         </p:grpSpPr>
         <p:sp>
@@ -8606,8 +8606,8 @@
           </p:nvSpPr>
           <p:spPr>
             <a:xfrm>
-              <a:off x="-5041210" y="-504512"/>
-              <a:ext cx="8293269" cy="5567440"/>
+              <a:off x="-4162948" y="-408785"/>
+              <a:ext cx="6288674" cy="6303330"/>
             </a:xfrm>
             <a:prstGeom prst="rect">
               <a:avLst/>
@@ -8686,7 +8686,7 @@
           </p:blipFill>
           <p:spPr>
             <a:xfrm>
-              <a:off x="-5041210" y="-504106"/>
+              <a:off x="-4164368" y="-411481"/>
               <a:ext cx="381000" cy="381000"/>
             </a:xfrm>
             <a:prstGeom prst="rect">
@@ -8709,9 +8709,9 @@
         </p:nvGrpSpPr>
         <p:grpSpPr>
           <a:xfrm>
-            <a:off x="10530510" y="4990336"/>
+            <a:off x="7503637" y="5565472"/>
             <a:ext cx="2243137" cy="985169"/>
-            <a:chOff x="6741009" y="1093610"/>
+            <a:chOff x="6702909" y="1093610"/>
             <a:chExt cx="2243137" cy="985169"/>
           </a:xfrm>
         </p:grpSpPr>
@@ -8766,7 +8766,7 @@
           </p:nvSpPr>
           <p:spPr>
             <a:xfrm>
-              <a:off x="6741009" y="1801780"/>
+              <a:off x="6702909" y="1801780"/>
               <a:ext cx="2243137" cy="276999"/>
             </a:xfrm>
             <a:prstGeom prst="rect">
@@ -8815,383 +8815,6 @@
           </p:txBody>
         </p:sp>
       </p:grpSp>
-      <p:cxnSp>
-        <p:nvCxnSpPr>
-          <p:cNvPr id="61" name="연결선: 꺾임 60">
-            <a:extLst>
-              <a:ext uri="{FF2B5EF4-FFF2-40B4-BE49-F238E27FC236}">
-                <a16:creationId xmlns:a16="http://schemas.microsoft.com/office/drawing/2014/main" id="{93EA9C7C-C628-C09A-1A1C-A97FBCE02E27}"/>
-              </a:ext>
-            </a:extLst>
-          </p:cNvPr>
-          <p:cNvCxnSpPr>
-            <a:cxnSpLocks/>
-          </p:cNvCxnSpPr>
-          <p:nvPr/>
-        </p:nvCxnSpPr>
-        <p:spPr>
-          <a:xfrm>
-            <a:off x="905267" y="4470241"/>
-            <a:ext cx="1629018" cy="1999220"/>
-          </a:xfrm>
-          <a:prstGeom prst="bentConnector3">
-            <a:avLst>
-              <a:gd name="adj1" fmla="val 50000"/>
-            </a:avLst>
-          </a:prstGeom>
-          <a:ln w="19050">
-            <a:solidFill>
-              <a:schemeClr val="accent6"/>
-            </a:solidFill>
-            <a:tailEnd type="triangle"/>
-          </a:ln>
-        </p:spPr>
-        <p:style>
-          <a:lnRef idx="1">
-            <a:schemeClr val="dk1"/>
-          </a:lnRef>
-          <a:fillRef idx="0">
-            <a:schemeClr val="dk1"/>
-          </a:fillRef>
-          <a:effectRef idx="0">
-            <a:schemeClr val="dk1"/>
-          </a:effectRef>
-          <a:fontRef idx="minor">
-            <a:schemeClr val="tx1"/>
-          </a:fontRef>
-        </p:style>
-      </p:cxnSp>
-      <p:sp>
-        <p:nvSpPr>
-          <p:cNvPr id="56" name="label">
-            <a:extLst>
-              <a:ext uri="{FF2B5EF4-FFF2-40B4-BE49-F238E27FC236}">
-                <a16:creationId xmlns:a16="http://schemas.microsoft.com/office/drawing/2014/main" id="{D90A29EC-0622-764A-D92D-F743C57A442B}"/>
-              </a:ext>
-            </a:extLst>
-          </p:cNvPr>
-          <p:cNvSpPr txBox="1">
-            <a:spLocks noChangeArrowheads="1"/>
-          </p:cNvSpPr>
-          <p:nvPr/>
-        </p:nvSpPr>
-        <p:spPr>
-          <a:xfrm>
-            <a:off x="924780" y="2048243"/>
-            <a:ext cx="1006074" cy="246221"/>
-          </a:xfrm>
-          <a:prstGeom prst="rect">
-            <a:avLst/>
-          </a:prstGeom>
-          <a:solidFill>
-            <a:schemeClr val="bg1"/>
-          </a:solidFill>
-          <a:ln>
-            <a:noFill/>
-          </a:ln>
-        </p:spPr>
-        <p:style>
-          <a:lnRef idx="2">
-            <a:schemeClr val="dk1">
-              <a:shade val="15000"/>
-            </a:schemeClr>
-          </a:lnRef>
-          <a:fillRef idx="1">
-            <a:schemeClr val="dk1"/>
-          </a:fillRef>
-          <a:effectRef idx="0">
-            <a:schemeClr val="dk1"/>
-          </a:effectRef>
-          <a:fontRef idx="minor">
-            <a:schemeClr val="lt1"/>
-          </a:fontRef>
-        </p:style>
-        <p:txBody>
-          <a:bodyPr wrap="square">
-            <a:spAutoFit/>
-          </a:bodyPr>
-          <a:lstStyle>
-            <a:lvl1pPr marL="0" indent="0">
-              <a:lnSpc>
-                <a:spcPct val="100000"/>
-              </a:lnSpc>
-              <a:spcBef>
-                <a:spcPct val="0"/>
-              </a:spcBef>
-              <a:spcAft>
-                <a:spcPts val="0"/>
-              </a:spcAft>
-              <a:defRPr kumimoji="0" sz="1800" b="0" i="0" u="none" strike="noStrike" kern="0" cap="none" spc="0" normalizeH="0" baseline="0">
-                <a:solidFill>
-                  <a:schemeClr val="tx1"/>
-                </a:solidFill>
-              </a:defRPr>
-            </a:lvl1pPr>
-          </a:lstStyle>
-          <a:p>
-            <a:pPr algn="ctr" eaLnBrk="1" hangingPunct="1">
-              <a:defRPr/>
-            </a:pPr>
-            <a:r>
-              <a:rPr lang="en-US" altLang="en-US" sz="1000" i="1" dirty="0">
-                <a:latin typeface="Arial"/>
-                <a:cs typeface="Arial"/>
-              </a:rPr>
-              <a:t>Upload Video</a:t>
-            </a:r>
-          </a:p>
-        </p:txBody>
-      </p:sp>
-      <p:sp>
-        <p:nvSpPr>
-          <p:cNvPr id="123" name="label">
-            <a:extLst>
-              <a:ext uri="{FF2B5EF4-FFF2-40B4-BE49-F238E27FC236}">
-                <a16:creationId xmlns:a16="http://schemas.microsoft.com/office/drawing/2014/main" id="{3E566940-318D-2E75-79EF-E0421FF11678}"/>
-              </a:ext>
-            </a:extLst>
-          </p:cNvPr>
-          <p:cNvSpPr txBox="1">
-            <a:spLocks noChangeArrowheads="1"/>
-          </p:cNvSpPr>
-          <p:nvPr/>
-        </p:nvSpPr>
-        <p:spPr>
-          <a:xfrm>
-            <a:off x="458051" y="404519"/>
-            <a:ext cx="1172413" cy="246221"/>
-          </a:xfrm>
-          <a:prstGeom prst="rect">
-            <a:avLst/>
-          </a:prstGeom>
-          <a:solidFill>
-            <a:schemeClr val="bg1"/>
-          </a:solidFill>
-          <a:ln>
-            <a:solidFill>
-              <a:schemeClr val="bg1"/>
-            </a:solidFill>
-          </a:ln>
-        </p:spPr>
-        <p:style>
-          <a:lnRef idx="2">
-            <a:schemeClr val="dk1"/>
-          </a:lnRef>
-          <a:fillRef idx="1">
-            <a:schemeClr val="lt1"/>
-          </a:fillRef>
-          <a:effectRef idx="0">
-            <a:schemeClr val="dk1"/>
-          </a:effectRef>
-          <a:fontRef idx="minor">
-            <a:schemeClr val="dk1"/>
-          </a:fontRef>
-        </p:style>
-        <p:txBody>
-          <a:bodyPr wrap="square">
-            <a:spAutoFit/>
-          </a:bodyPr>
-          <a:lstStyle>
-            <a:lvl1pPr marL="0" indent="0">
-              <a:lnSpc>
-                <a:spcPct val="100000"/>
-              </a:lnSpc>
-              <a:spcBef>
-                <a:spcPct val="0"/>
-              </a:spcBef>
-              <a:spcAft>
-                <a:spcPts val="0"/>
-              </a:spcAft>
-              <a:defRPr kumimoji="0" sz="1800" b="0" i="0" u="none" strike="noStrike" kern="0" cap="none" spc="0" normalizeH="0" baseline="0">
-                <a:solidFill>
-                  <a:schemeClr val="tx1"/>
-                </a:solidFill>
-              </a:defRPr>
-            </a:lvl1pPr>
-          </a:lstStyle>
-          <a:p>
-            <a:pPr algn="ctr" eaLnBrk="1" hangingPunct="1">
-              <a:defRPr/>
-            </a:pPr>
-            <a:r>
-              <a:rPr lang="en-US" altLang="en-US" sz="1000" i="1" dirty="0">
-                <a:latin typeface="Arial"/>
-                <a:cs typeface="Arial"/>
-              </a:rPr>
-              <a:t>Analyzed Data</a:t>
-            </a:r>
-          </a:p>
-        </p:txBody>
-      </p:sp>
-      <p:sp>
-        <p:nvSpPr>
-          <p:cNvPr id="169" name="TextBox 168">
-            <a:extLst>
-              <a:ext uri="{FF2B5EF4-FFF2-40B4-BE49-F238E27FC236}">
-                <a16:creationId xmlns:a16="http://schemas.microsoft.com/office/drawing/2014/main" id="{69FBF9EB-9BCE-2ACB-79E0-BBDE52B626B6}"/>
-              </a:ext>
-            </a:extLst>
-          </p:cNvPr>
-          <p:cNvSpPr txBox="1"/>
-          <p:nvPr/>
-        </p:nvSpPr>
-        <p:spPr>
-          <a:xfrm>
-            <a:off x="718085" y="1707231"/>
-            <a:ext cx="671979" cy="323165"/>
-          </a:xfrm>
-          <a:prstGeom prst="rect">
-            <a:avLst/>
-          </a:prstGeom>
-          <a:solidFill>
-            <a:srgbClr val="FF0066"/>
-          </a:solidFill>
-        </p:spPr>
-        <p:style>
-          <a:lnRef idx="2">
-            <a:schemeClr val="accent4">
-              <a:shade val="15000"/>
-            </a:schemeClr>
-          </a:lnRef>
-          <a:fillRef idx="1">
-            <a:schemeClr val="accent4"/>
-          </a:fillRef>
-          <a:effectRef idx="0">
-            <a:schemeClr val="accent4"/>
-          </a:effectRef>
-          <a:fontRef idx="minor">
-            <a:schemeClr val="lt1"/>
-          </a:fontRef>
-        </p:style>
-        <p:txBody>
-          <a:bodyPr wrap="none" rtlCol="0">
-            <a:spAutoFit/>
-          </a:bodyPr>
-          <a:lstStyle/>
-          <a:p>
-            <a:r>
-              <a:rPr lang="en-US" altLang="ko-KR" sz="1500" b="1" dirty="0">
-                <a:solidFill>
-                  <a:schemeClr val="bg1"/>
-                </a:solidFill>
-              </a:rPr>
-              <a:t>Input</a:t>
-            </a:r>
-            <a:endParaRPr lang="ko-KR" altLang="en-US" sz="1500" b="1" dirty="0">
-              <a:solidFill>
-                <a:schemeClr val="bg1"/>
-              </a:solidFill>
-            </a:endParaRPr>
-          </a:p>
-        </p:txBody>
-      </p:sp>
-      <p:cxnSp>
-        <p:nvCxnSpPr>
-          <p:cNvPr id="9" name="직선 화살표 연결선 8">
-            <a:extLst>
-              <a:ext uri="{FF2B5EF4-FFF2-40B4-BE49-F238E27FC236}">
-                <a16:creationId xmlns:a16="http://schemas.microsoft.com/office/drawing/2014/main" id="{2B07837E-1F65-8B79-FCB2-0DEDE3552CE7}"/>
-              </a:ext>
-            </a:extLst>
-          </p:cNvPr>
-          <p:cNvCxnSpPr>
-            <a:stCxn id="48" idx="3"/>
-            <a:endCxn id="4" idx="1"/>
-          </p:cNvCxnSpPr>
-          <p:nvPr/>
-        </p:nvCxnSpPr>
-        <p:spPr>
-          <a:xfrm>
-            <a:off x="5885641" y="4983620"/>
-            <a:ext cx="2946198" cy="381737"/>
-          </a:xfrm>
-          <a:prstGeom prst="straightConnector1">
-            <a:avLst/>
-          </a:prstGeom>
-          <a:ln w="19050">
-            <a:solidFill>
-              <a:schemeClr val="accent6"/>
-            </a:solidFill>
-            <a:tailEnd type="triangle"/>
-          </a:ln>
-        </p:spPr>
-        <p:style>
-          <a:lnRef idx="1">
-            <a:schemeClr val="accent1"/>
-          </a:lnRef>
-          <a:fillRef idx="0">
-            <a:schemeClr val="accent1"/>
-          </a:fillRef>
-          <a:effectRef idx="0">
-            <a:schemeClr val="accent1"/>
-          </a:effectRef>
-          <a:fontRef idx="minor">
-            <a:schemeClr val="tx1"/>
-          </a:fontRef>
-        </p:style>
-      </p:cxnSp>
-      <p:sp>
-        <p:nvSpPr>
-          <p:cNvPr id="58" name="TextBox 57">
-            <a:extLst>
-              <a:ext uri="{FF2B5EF4-FFF2-40B4-BE49-F238E27FC236}">
-                <a16:creationId xmlns:a16="http://schemas.microsoft.com/office/drawing/2014/main" id="{BAE93ABB-36FE-A60C-0CD8-3F07C56EC9E1}"/>
-              </a:ext>
-            </a:extLst>
-          </p:cNvPr>
-          <p:cNvSpPr txBox="1"/>
-          <p:nvPr/>
-        </p:nvSpPr>
-        <p:spPr>
-          <a:xfrm>
-            <a:off x="374545" y="726774"/>
-            <a:ext cx="835485" cy="323165"/>
-          </a:xfrm>
-          <a:prstGeom prst="rect">
-            <a:avLst/>
-          </a:prstGeom>
-          <a:solidFill>
-            <a:srgbClr val="FF0066"/>
-          </a:solidFill>
-        </p:spPr>
-        <p:style>
-          <a:lnRef idx="2">
-            <a:schemeClr val="accent4">
-              <a:shade val="15000"/>
-            </a:schemeClr>
-          </a:lnRef>
-          <a:fillRef idx="1">
-            <a:schemeClr val="accent4"/>
-          </a:fillRef>
-          <a:effectRef idx="0">
-            <a:schemeClr val="accent4"/>
-          </a:effectRef>
-          <a:fontRef idx="minor">
-            <a:schemeClr val="lt1"/>
-          </a:fontRef>
-        </p:style>
-        <p:txBody>
-          <a:bodyPr wrap="none" rtlCol="0">
-            <a:spAutoFit/>
-          </a:bodyPr>
-          <a:lstStyle/>
-          <a:p>
-            <a:r>
-              <a:rPr lang="en-US" altLang="ko-KR" sz="1500" b="1" dirty="0">
-                <a:solidFill>
-                  <a:schemeClr val="bg1"/>
-                </a:solidFill>
-              </a:rPr>
-              <a:t>Output</a:t>
-            </a:r>
-            <a:endParaRPr lang="ko-KR" altLang="en-US" sz="1500" b="1" dirty="0">
-              <a:solidFill>
-                <a:schemeClr val="bg1"/>
-              </a:solidFill>
-            </a:endParaRPr>
-          </a:p>
-        </p:txBody>
-      </p:sp>
       <p:grpSp>
         <p:nvGrpSpPr>
           <p:cNvPr id="103" name="그룹 102">
@@ -9206,7 +8829,7 @@
         </p:nvGrpSpPr>
         <p:grpSpPr>
           <a:xfrm>
-            <a:off x="10589213" y="2424707"/>
+            <a:off x="12606436" y="57875"/>
             <a:ext cx="1727273" cy="1007249"/>
             <a:chOff x="10497370" y="2847616"/>
             <a:chExt cx="1727273" cy="1007249"/>
@@ -9459,51 +9082,6 @@
           </p:txBody>
         </p:sp>
       </p:grpSp>
-      <p:cxnSp>
-        <p:nvCxnSpPr>
-          <p:cNvPr id="105" name="직선 화살표 연결선 104">
-            <a:extLst>
-              <a:ext uri="{FF2B5EF4-FFF2-40B4-BE49-F238E27FC236}">
-                <a16:creationId xmlns:a16="http://schemas.microsoft.com/office/drawing/2014/main" id="{B8A99F07-5E60-5D7A-6E60-51D817B2BA7A}"/>
-              </a:ext>
-            </a:extLst>
-          </p:cNvPr>
-          <p:cNvCxnSpPr>
-            <a:cxnSpLocks/>
-            <a:stCxn id="101" idx="1"/>
-          </p:cNvCxnSpPr>
-          <p:nvPr/>
-        </p:nvCxnSpPr>
-        <p:spPr>
-          <a:xfrm flipH="1">
-            <a:off x="10149611" y="2777507"/>
-            <a:ext cx="922239" cy="28200"/>
-          </a:xfrm>
-          <a:prstGeom prst="straightConnector1">
-            <a:avLst/>
-          </a:prstGeom>
-          <a:ln w="19050">
-            <a:solidFill>
-              <a:schemeClr val="tx1"/>
-            </a:solidFill>
-            <a:tailEnd type="triangle"/>
-          </a:ln>
-        </p:spPr>
-        <p:style>
-          <a:lnRef idx="1">
-            <a:schemeClr val="accent1"/>
-          </a:lnRef>
-          <a:fillRef idx="0">
-            <a:schemeClr val="accent1"/>
-          </a:fillRef>
-          <a:effectRef idx="0">
-            <a:schemeClr val="accent1"/>
-          </a:effectRef>
-          <a:fontRef idx="minor">
-            <a:schemeClr val="tx1"/>
-          </a:fontRef>
-        </p:style>
-      </p:cxnSp>
       <p:grpSp>
         <p:nvGrpSpPr>
           <p:cNvPr id="2" name="VPCGroup" descr="Virtual private cloud (VPC) group inside the AWS Cloud grouping.">
@@ -9518,7 +9096,7 @@
         </p:nvGrpSpPr>
         <p:grpSpPr>
           <a:xfrm>
-            <a:off x="3449845" y="1267452"/>
+            <a:off x="3251579" y="798250"/>
             <a:ext cx="6217130" cy="3136928"/>
             <a:chOff x="4858238" y="2084361"/>
             <a:chExt cx="6833324" cy="3409837"/>
@@ -9621,7 +9199,7 @@
           </p:blipFill>
           <p:spPr>
             <a:xfrm>
-              <a:off x="4858238" y="2097862"/>
+              <a:off x="4858238" y="2090097"/>
               <a:ext cx="381000" cy="381000"/>
             </a:xfrm>
             <a:prstGeom prst="rect">
@@ -9644,7 +9222,7 @@
         </p:nvSpPr>
         <p:spPr>
           <a:xfrm>
-            <a:off x="4081680" y="2218616"/>
+            <a:off x="3883414" y="1749414"/>
             <a:ext cx="5219889" cy="1823382"/>
           </a:xfrm>
           <a:prstGeom prst="rect">
@@ -9717,9 +9295,9 @@
         </p:nvGrpSpPr>
         <p:grpSpPr>
           <a:xfrm>
-            <a:off x="4438317" y="4630820"/>
+            <a:off x="4194522" y="4100294"/>
             <a:ext cx="2239962" cy="1006114"/>
-            <a:chOff x="5374440" y="5267982"/>
+            <a:chOff x="5355390" y="5267982"/>
             <a:chExt cx="2239962" cy="1006114"/>
           </a:xfrm>
         </p:grpSpPr>
@@ -9774,7 +9352,7 @@
           </p:nvSpPr>
           <p:spPr>
             <a:xfrm>
-              <a:off x="5374440" y="5997097"/>
+              <a:off x="5355390" y="5997097"/>
               <a:ext cx="2239962" cy="276999"/>
             </a:xfrm>
             <a:prstGeom prst="rect">
@@ -9839,7 +9417,7 @@
         </p:nvSpPr>
         <p:spPr>
           <a:xfrm>
-            <a:off x="1096233" y="5463776"/>
+            <a:off x="-1040531" y="3797457"/>
             <a:ext cx="827880" cy="246221"/>
           </a:xfrm>
           <a:prstGeom prst="rect">
@@ -9918,7 +9496,7 @@
         </p:nvSpPr>
         <p:spPr>
           <a:xfrm>
-            <a:off x="1065745" y="5147848"/>
+            <a:off x="1593312" y="1887936"/>
             <a:ext cx="290464" cy="323165"/>
           </a:xfrm>
           <a:prstGeom prst="rect">
@@ -9977,10 +9555,10 @@
         </p:nvGrpSpPr>
         <p:grpSpPr>
           <a:xfrm>
-            <a:off x="8083940" y="5012557"/>
-            <a:ext cx="2292350" cy="1193781"/>
-            <a:chOff x="8350640" y="5267982"/>
-            <a:chExt cx="2292350" cy="1193781"/>
+            <a:off x="5797645" y="4096621"/>
+            <a:ext cx="2292350" cy="1163003"/>
+            <a:chOff x="8283965" y="5267982"/>
+            <a:chExt cx="2292350" cy="1163003"/>
           </a:xfrm>
         </p:grpSpPr>
         <p:pic>
@@ -10057,8 +9635,8 @@
           </p:nvSpPr>
           <p:spPr bwMode="auto">
             <a:xfrm>
-              <a:off x="8350640" y="6000098"/>
-              <a:ext cx="2292350" cy="461665"/>
+              <a:off x="8283965" y="6000098"/>
+              <a:ext cx="2292350" cy="430887"/>
             </a:xfrm>
             <a:prstGeom prst="rect">
               <a:avLst/>
@@ -10230,12 +9808,12 @@
             <a:p>
               <a:pPr algn="ctr" eaLnBrk="1" hangingPunct="1"/>
               <a:r>
-                <a:rPr lang="en-US" altLang="en-US" sz="1200" dirty="0">
+                <a:rPr lang="en-US" altLang="en-US" sz="1000" dirty="0">
                   <a:latin typeface="Arial" panose="020B0604020202020204" pitchFamily="34" charset="0"/>
                   <a:ea typeface="Amazon Ember" panose="020B0603020204020204" pitchFamily="34" charset="0"/>
                   <a:cs typeface="Arial" panose="020B0604020202020204" pitchFamily="34" charset="0"/>
                 </a:rPr>
-                <a:t>(Feature Extraction)</a:t>
+                <a:t>(Run Python File)</a:t>
               </a:r>
             </a:p>
           </p:txBody>
@@ -10243,10 +9821,10 @@
       </p:grpSp>
       <p:sp>
         <p:nvSpPr>
-          <p:cNvPr id="149" name="label">
-            <a:extLst>
-              <a:ext uri="{FF2B5EF4-FFF2-40B4-BE49-F238E27FC236}">
-                <a16:creationId xmlns:a16="http://schemas.microsoft.com/office/drawing/2014/main" id="{BF579B65-B8C7-5FD6-E7FC-FC30C7F55870}"/>
+          <p:cNvPr id="23" name="TextBox 6">
+            <a:extLst>
+              <a:ext uri="{FF2B5EF4-FFF2-40B4-BE49-F238E27FC236}">
+                <a16:creationId xmlns:a16="http://schemas.microsoft.com/office/drawing/2014/main" id="{36FEB6A7-BBBF-BF4E-B09F-F70950BA7F04}"/>
               </a:ext>
             </a:extLst>
           </p:cNvPr>
@@ -10255,440 +9833,176 @@
           </p:cNvSpPr>
           <p:nvPr/>
         </p:nvSpPr>
-        <p:spPr>
+        <p:spPr bwMode="auto">
           <a:xfrm>
-            <a:off x="7336992" y="5262744"/>
-            <a:ext cx="674040" cy="246221"/>
+            <a:off x="5169264" y="1972874"/>
+            <a:ext cx="2496630" cy="276999"/>
           </a:xfrm>
           <a:prstGeom prst="rect">
             <a:avLst/>
           </a:prstGeom>
-          <a:solidFill>
-            <a:schemeClr val="bg1"/>
-          </a:solidFill>
+          <a:noFill/>
           <a:ln>
-            <a:solidFill>
-              <a:schemeClr val="bg1"/>
-            </a:solidFill>
+            <a:noFill/>
           </a:ln>
+          <a:extLst>
+            <a:ext uri="{909E8E84-426E-40DD-AFC4-6F175D3DCCD1}">
+              <a14:hiddenFill xmlns:a14="http://schemas.microsoft.com/office/drawing/2010/main">
+                <a:solidFill>
+                  <a:srgbClr val="FFFFFF"/>
+                </a:solidFill>
+              </a14:hiddenFill>
+            </a:ext>
+            <a:ext uri="{91240B29-F687-4F45-9708-019B960494DF}">
+              <a14:hiddenLine xmlns:a14="http://schemas.microsoft.com/office/drawing/2010/main" w="9525">
+                <a:solidFill>
+                  <a:srgbClr val="000000"/>
+                </a:solidFill>
+                <a:miter lim="800000"/>
+                <a:headEnd/>
+                <a:tailEnd/>
+              </a14:hiddenLine>
+            </a:ext>
+          </a:extLst>
         </p:spPr>
-        <p:style>
-          <a:lnRef idx="2">
-            <a:schemeClr val="dk1"/>
-          </a:lnRef>
-          <a:fillRef idx="1">
-            <a:schemeClr val="lt1"/>
-          </a:fillRef>
-          <a:effectRef idx="0">
-            <a:schemeClr val="dk1"/>
-          </a:effectRef>
-          <a:fontRef idx="minor">
-            <a:schemeClr val="dk1"/>
-          </a:fontRef>
-        </p:style>
         <p:txBody>
-          <a:bodyPr wrap="square">
+          <a:bodyPr>
             <a:spAutoFit/>
           </a:bodyPr>
           <a:lstStyle>
-            <a:lvl1pPr marL="0" indent="0">
-              <a:lnSpc>
-                <a:spcPct val="100000"/>
-              </a:lnSpc>
+            <a:defPPr>
+              <a:defRPr lang="en-US"/>
+            </a:defPPr>
+            <a:lvl1pPr algn="l" rtl="0" eaLnBrk="0" fontAlgn="base" hangingPunct="0">
               <a:spcBef>
                 <a:spcPct val="0"/>
               </a:spcBef>
               <a:spcAft>
-                <a:spcPts val="0"/>
+                <a:spcPct val="0"/>
               </a:spcAft>
-              <a:defRPr kumimoji="0" sz="1800" b="0" i="0" u="none" strike="noStrike" kern="0" cap="none" spc="0" normalizeH="0" baseline="0">
+              <a:defRPr kern="1200">
                 <a:solidFill>
                   <a:schemeClr val="tx1"/>
                 </a:solidFill>
+                <a:latin typeface="Calibri" panose="020F0502020204030204" pitchFamily="34" charset="0"/>
+                <a:ea typeface="+mn-ea"/>
+                <a:cs typeface="+mn-cs"/>
               </a:defRPr>
             </a:lvl1pPr>
-          </a:lstStyle>
-          <a:p>
-            <a:pPr algn="ctr" eaLnBrk="1" hangingPunct="1">
-              <a:defRPr/>
-            </a:pPr>
-            <a:r>
-              <a:rPr lang="en-US" altLang="en-US" sz="1000" i="1" dirty="0">
-                <a:latin typeface="Arial"/>
-                <a:cs typeface="Arial"/>
-              </a:rPr>
-              <a:t>Trigger</a:t>
-            </a:r>
-          </a:p>
-        </p:txBody>
-      </p:sp>
-      <p:grpSp>
-        <p:nvGrpSpPr>
-          <p:cNvPr id="94" name="그룹 93">
-            <a:extLst>
-              <a:ext uri="{FF2B5EF4-FFF2-40B4-BE49-F238E27FC236}">
-                <a16:creationId xmlns:a16="http://schemas.microsoft.com/office/drawing/2014/main" id="{8CF7D00E-4D13-1B89-D66D-A947A2F6CD6B}"/>
-              </a:ext>
-            </a:extLst>
-          </p:cNvPr>
-          <p:cNvGrpSpPr/>
-          <p:nvPr/>
-        </p:nvGrpSpPr>
-        <p:grpSpPr>
-          <a:xfrm>
-            <a:off x="4343720" y="2753531"/>
-            <a:ext cx="2496630" cy="1204187"/>
-            <a:chOff x="7588899" y="3319934"/>
-            <a:chExt cx="2268537" cy="1094172"/>
-          </a:xfrm>
-        </p:grpSpPr>
-        <p:pic>
-          <p:nvPicPr>
-            <p:cNvPr id="22" name="Graphic 5" descr="Amazon Elastic Compute Cloud (Amazon EC2) service icon.">
-              <a:extLst>
-                <a:ext uri="{FF2B5EF4-FFF2-40B4-BE49-F238E27FC236}">
-                  <a16:creationId xmlns:a16="http://schemas.microsoft.com/office/drawing/2014/main" id="{38622D4A-AB16-E74E-A250-BDBAAFFAA603}"/>
-                </a:ext>
-              </a:extLst>
-            </p:cNvPr>
-            <p:cNvPicPr>
-              <a:picLocks noChangeAspect="1" noChangeArrowheads="1"/>
-            </p:cNvPicPr>
-            <p:nvPr/>
-          </p:nvPicPr>
-          <p:blipFill>
-            <a:blip r:embed="rId12">
-              <a:extLst>
-                <a:ext uri="{96DAC541-7B7A-43D3-8B79-37D633B846F1}">
-                  <asvg:svgBlip xmlns:asvg="http://schemas.microsoft.com/office/drawing/2016/SVG/main" r:embed="rId13"/>
-                </a:ext>
-              </a:extLst>
-            </a:blip>
-            <a:srcRect/>
-            <a:stretch/>
-          </p:blipFill>
-          <p:spPr bwMode="auto">
-            <a:xfrm>
-              <a:off x="7651155" y="3319934"/>
-              <a:ext cx="640634" cy="640634"/>
-            </a:xfrm>
-            <a:prstGeom prst="rect">
-              <a:avLst/>
-            </a:prstGeom>
-            <a:noFill/>
-            <a:ln>
-              <a:noFill/>
-            </a:ln>
-            <a:extLst>
-              <a:ext uri="{909E8E84-426E-40DD-AFC4-6F175D3DCCD1}">
-                <a14:hiddenFill xmlns:a14="http://schemas.microsoft.com/office/drawing/2010/main">
-                  <a:solidFill>
-                    <a:srgbClr val="FFFFFF"/>
-                  </a:solidFill>
-                </a14:hiddenFill>
-              </a:ext>
-              <a:ext uri="{91240B29-F687-4F45-9708-019B960494DF}">
-                <a14:hiddenLine xmlns:a14="http://schemas.microsoft.com/office/drawing/2010/main" w="9525">
-                  <a:solidFill>
-                    <a:srgbClr val="000000"/>
-                  </a:solidFill>
-                  <a:miter lim="800000"/>
-                  <a:headEnd/>
-                  <a:tailEnd/>
-                </a14:hiddenLine>
-              </a:ext>
-            </a:extLst>
-          </p:spPr>
-        </p:pic>
-        <p:sp>
-          <p:nvSpPr>
-            <p:cNvPr id="23" name="TextBox 6">
-              <a:extLst>
-                <a:ext uri="{FF2B5EF4-FFF2-40B4-BE49-F238E27FC236}">
-                  <a16:creationId xmlns:a16="http://schemas.microsoft.com/office/drawing/2014/main" id="{36FEB6A7-BBBF-BF4E-B09F-F70950BA7F04}"/>
-                </a:ext>
-              </a:extLst>
-            </p:cNvPr>
-            <p:cNvSpPr txBox="1">
-              <a:spLocks noChangeArrowheads="1"/>
-            </p:cNvSpPr>
-            <p:nvPr/>
-          </p:nvSpPr>
-          <p:spPr bwMode="auto">
-            <a:xfrm>
-              <a:off x="7588899" y="3952441"/>
-              <a:ext cx="2268537" cy="461665"/>
-            </a:xfrm>
-            <a:prstGeom prst="rect">
-              <a:avLst/>
-            </a:prstGeom>
-            <a:noFill/>
-            <a:ln>
-              <a:noFill/>
-            </a:ln>
-            <a:extLst>
-              <a:ext uri="{909E8E84-426E-40DD-AFC4-6F175D3DCCD1}">
-                <a14:hiddenFill xmlns:a14="http://schemas.microsoft.com/office/drawing/2010/main">
-                  <a:solidFill>
-                    <a:srgbClr val="FFFFFF"/>
-                  </a:solidFill>
-                </a14:hiddenFill>
-              </a:ext>
-              <a:ext uri="{91240B29-F687-4F45-9708-019B960494DF}">
-                <a14:hiddenLine xmlns:a14="http://schemas.microsoft.com/office/drawing/2010/main" w="9525">
-                  <a:solidFill>
-                    <a:srgbClr val="000000"/>
-                  </a:solidFill>
-                  <a:miter lim="800000"/>
-                  <a:headEnd/>
-                  <a:tailEnd/>
-                </a14:hiddenLine>
-              </a:ext>
-            </a:extLst>
-          </p:spPr>
-          <p:txBody>
-            <a:bodyPr>
-              <a:spAutoFit/>
-            </a:bodyPr>
-            <a:lstStyle>
-              <a:defPPr>
-                <a:defRPr lang="en-US"/>
-              </a:defPPr>
-              <a:lvl1pPr algn="l" rtl="0" eaLnBrk="0" fontAlgn="base" hangingPunct="0">
-                <a:spcBef>
-                  <a:spcPct val="0"/>
-                </a:spcBef>
-                <a:spcAft>
-                  <a:spcPct val="0"/>
-                </a:spcAft>
-                <a:defRPr kern="1200">
-                  <a:solidFill>
-                    <a:schemeClr val="tx1"/>
-                  </a:solidFill>
-                  <a:latin typeface="Calibri" panose="020F0502020204030204" pitchFamily="34" charset="0"/>
-                  <a:ea typeface="+mn-ea"/>
-                  <a:cs typeface="+mn-cs"/>
-                </a:defRPr>
-              </a:lvl1pPr>
-              <a:lvl2pPr marL="457200" algn="l" rtl="0" eaLnBrk="0" fontAlgn="base" hangingPunct="0">
-                <a:spcBef>
-                  <a:spcPct val="0"/>
-                </a:spcBef>
-                <a:spcAft>
-                  <a:spcPct val="0"/>
-                </a:spcAft>
-                <a:defRPr kern="1200">
-                  <a:solidFill>
-                    <a:schemeClr val="tx1"/>
-                  </a:solidFill>
-                  <a:latin typeface="Calibri" panose="020F0502020204030204" pitchFamily="34" charset="0"/>
-                  <a:ea typeface="+mn-ea"/>
-                  <a:cs typeface="+mn-cs"/>
-                </a:defRPr>
-              </a:lvl2pPr>
-              <a:lvl3pPr marL="914400" algn="l" rtl="0" eaLnBrk="0" fontAlgn="base" hangingPunct="0">
-                <a:spcBef>
-                  <a:spcPct val="0"/>
-                </a:spcBef>
-                <a:spcAft>
-                  <a:spcPct val="0"/>
-                </a:spcAft>
-                <a:defRPr kern="1200">
-                  <a:solidFill>
-                    <a:schemeClr val="tx1"/>
-                  </a:solidFill>
-                  <a:latin typeface="Calibri" panose="020F0502020204030204" pitchFamily="34" charset="0"/>
-                  <a:ea typeface="+mn-ea"/>
-                  <a:cs typeface="+mn-cs"/>
-                </a:defRPr>
-              </a:lvl3pPr>
-              <a:lvl4pPr marL="1371600" algn="l" rtl="0" eaLnBrk="0" fontAlgn="base" hangingPunct="0">
-                <a:spcBef>
-                  <a:spcPct val="0"/>
-                </a:spcBef>
-                <a:spcAft>
-                  <a:spcPct val="0"/>
-                </a:spcAft>
-                <a:defRPr kern="1200">
-                  <a:solidFill>
-                    <a:schemeClr val="tx1"/>
-                  </a:solidFill>
-                  <a:latin typeface="Calibri" panose="020F0502020204030204" pitchFamily="34" charset="0"/>
-                  <a:ea typeface="+mn-ea"/>
-                  <a:cs typeface="+mn-cs"/>
-                </a:defRPr>
-              </a:lvl4pPr>
-              <a:lvl5pPr marL="1828800" algn="l" rtl="0" eaLnBrk="0" fontAlgn="base" hangingPunct="0">
-                <a:spcBef>
-                  <a:spcPct val="0"/>
-                </a:spcBef>
-                <a:spcAft>
-                  <a:spcPct val="0"/>
-                </a:spcAft>
-                <a:defRPr kern="1200">
-                  <a:solidFill>
-                    <a:schemeClr val="tx1"/>
-                  </a:solidFill>
-                  <a:latin typeface="Calibri" panose="020F0502020204030204" pitchFamily="34" charset="0"/>
-                  <a:ea typeface="+mn-ea"/>
-                  <a:cs typeface="+mn-cs"/>
-                </a:defRPr>
-              </a:lvl5pPr>
-              <a:lvl6pPr marL="2286000" algn="l" defTabSz="914400" rtl="0" eaLnBrk="1" latinLnBrk="0" hangingPunct="1">
-                <a:defRPr kern="1200">
-                  <a:solidFill>
-                    <a:schemeClr val="tx1"/>
-                  </a:solidFill>
-                  <a:latin typeface="Calibri" panose="020F0502020204030204" pitchFamily="34" charset="0"/>
-                  <a:ea typeface="+mn-ea"/>
-                  <a:cs typeface="+mn-cs"/>
-                </a:defRPr>
-              </a:lvl6pPr>
-              <a:lvl7pPr marL="2743200" algn="l" defTabSz="914400" rtl="0" eaLnBrk="1" latinLnBrk="0" hangingPunct="1">
-                <a:defRPr kern="1200">
-                  <a:solidFill>
-                    <a:schemeClr val="tx1"/>
-                  </a:solidFill>
-                  <a:latin typeface="Calibri" panose="020F0502020204030204" pitchFamily="34" charset="0"/>
-                  <a:ea typeface="+mn-ea"/>
-                  <a:cs typeface="+mn-cs"/>
-                </a:defRPr>
-              </a:lvl7pPr>
-              <a:lvl8pPr marL="3200400" algn="l" defTabSz="914400" rtl="0" eaLnBrk="1" latinLnBrk="0" hangingPunct="1">
-                <a:defRPr kern="1200">
-                  <a:solidFill>
-                    <a:schemeClr val="tx1"/>
-                  </a:solidFill>
-                  <a:latin typeface="Calibri" panose="020F0502020204030204" pitchFamily="34" charset="0"/>
-                  <a:ea typeface="+mn-ea"/>
-                  <a:cs typeface="+mn-cs"/>
-                </a:defRPr>
-              </a:lvl8pPr>
-              <a:lvl9pPr marL="3657600" algn="l" defTabSz="914400" rtl="0" eaLnBrk="1" latinLnBrk="0" hangingPunct="1">
-                <a:defRPr kern="1200">
-                  <a:solidFill>
-                    <a:schemeClr val="tx1"/>
-                  </a:solidFill>
-                  <a:latin typeface="Calibri" panose="020F0502020204030204" pitchFamily="34" charset="0"/>
-                  <a:ea typeface="+mn-ea"/>
-                  <a:cs typeface="+mn-cs"/>
-                </a:defRPr>
-              </a:lvl9pPr>
-            </a:lstStyle>
-            <a:p>
-              <a:pPr algn="ctr" eaLnBrk="1" hangingPunct="1"/>
-              <a:r>
-                <a:rPr lang="en-US" altLang="en-US" sz="1200" dirty="0">
-                  <a:latin typeface="Arial" panose="020B0604020202020204" pitchFamily="34" charset="0"/>
-                  <a:ea typeface="Amazon Ember" panose="020B0603020204020204" pitchFamily="34" charset="0"/>
-                  <a:cs typeface="Arial" panose="020B0604020202020204" pitchFamily="34" charset="0"/>
-                </a:rPr>
-                <a:t>Amazon EC2</a:t>
-              </a:r>
-            </a:p>
-            <a:p>
-              <a:pPr algn="ctr" eaLnBrk="1" hangingPunct="1"/>
-              <a:r>
-                <a:rPr lang="en-US" altLang="en-US" sz="1200" dirty="0">
-                  <a:latin typeface="Arial" panose="020B0604020202020204" pitchFamily="34" charset="0"/>
-                  <a:ea typeface="Amazon Ember" panose="020B0603020204020204" pitchFamily="34" charset="0"/>
-                  <a:cs typeface="Arial" panose="020B0604020202020204" pitchFamily="34" charset="0"/>
-                </a:rPr>
-                <a:t>(Web Server)</a:t>
-              </a:r>
-            </a:p>
-          </p:txBody>
-        </p:sp>
-      </p:grpSp>
-      <p:sp>
-        <p:nvSpPr>
-          <p:cNvPr id="117" name="label">
-            <a:extLst>
-              <a:ext uri="{FF2B5EF4-FFF2-40B4-BE49-F238E27FC236}">
-                <a16:creationId xmlns:a16="http://schemas.microsoft.com/office/drawing/2014/main" id="{B6C5C9AE-ACB7-9719-1663-2CD3F698156A}"/>
-              </a:ext>
-            </a:extLst>
-          </p:cNvPr>
-          <p:cNvSpPr txBox="1">
-            <a:spLocks noChangeArrowheads="1"/>
-          </p:cNvSpPr>
-          <p:nvPr/>
-        </p:nvSpPr>
-        <p:spPr>
-          <a:xfrm>
-            <a:off x="7454687" y="584854"/>
-            <a:ext cx="1172413" cy="400110"/>
-          </a:xfrm>
-          <a:prstGeom prst="rect">
-            <a:avLst/>
-          </a:prstGeom>
-          <a:solidFill>
-            <a:schemeClr val="bg1"/>
-          </a:solidFill>
-          <a:ln>
-            <a:solidFill>
-              <a:schemeClr val="bg1"/>
-            </a:solidFill>
-          </a:ln>
-        </p:spPr>
-        <p:style>
-          <a:lnRef idx="2">
-            <a:schemeClr val="dk1"/>
-          </a:lnRef>
-          <a:fillRef idx="1">
-            <a:schemeClr val="lt1"/>
-          </a:fillRef>
-          <a:effectRef idx="0">
-            <a:schemeClr val="dk1"/>
-          </a:effectRef>
-          <a:fontRef idx="minor">
-            <a:schemeClr val="dk1"/>
-          </a:fontRef>
-        </p:style>
-        <p:txBody>
-          <a:bodyPr wrap="square">
-            <a:spAutoFit/>
-          </a:bodyPr>
-          <a:lstStyle>
-            <a:lvl1pPr marL="0" indent="0">
-              <a:lnSpc>
-                <a:spcPct val="100000"/>
-              </a:lnSpc>
+            <a:lvl2pPr marL="457200" algn="l" rtl="0" eaLnBrk="0" fontAlgn="base" hangingPunct="0">
               <a:spcBef>
                 <a:spcPct val="0"/>
               </a:spcBef>
               <a:spcAft>
-                <a:spcPts val="0"/>
+                <a:spcPct val="0"/>
               </a:spcAft>
-              <a:defRPr kumimoji="0" sz="1800" b="0" i="0" u="none" strike="noStrike" kern="0" cap="none" spc="0" normalizeH="0" baseline="0">
+              <a:defRPr kern="1200">
                 <a:solidFill>
                   <a:schemeClr val="tx1"/>
                 </a:solidFill>
+                <a:latin typeface="Calibri" panose="020F0502020204030204" pitchFamily="34" charset="0"/>
+                <a:ea typeface="+mn-ea"/>
+                <a:cs typeface="+mn-cs"/>
               </a:defRPr>
-            </a:lvl1pPr>
+            </a:lvl2pPr>
+            <a:lvl3pPr marL="914400" algn="l" rtl="0" eaLnBrk="0" fontAlgn="base" hangingPunct="0">
+              <a:spcBef>
+                <a:spcPct val="0"/>
+              </a:spcBef>
+              <a:spcAft>
+                <a:spcPct val="0"/>
+              </a:spcAft>
+              <a:defRPr kern="1200">
+                <a:solidFill>
+                  <a:schemeClr val="tx1"/>
+                </a:solidFill>
+                <a:latin typeface="Calibri" panose="020F0502020204030204" pitchFamily="34" charset="0"/>
+                <a:ea typeface="+mn-ea"/>
+                <a:cs typeface="+mn-cs"/>
+              </a:defRPr>
+            </a:lvl3pPr>
+            <a:lvl4pPr marL="1371600" algn="l" rtl="0" eaLnBrk="0" fontAlgn="base" hangingPunct="0">
+              <a:spcBef>
+                <a:spcPct val="0"/>
+              </a:spcBef>
+              <a:spcAft>
+                <a:spcPct val="0"/>
+              </a:spcAft>
+              <a:defRPr kern="1200">
+                <a:solidFill>
+                  <a:schemeClr val="tx1"/>
+                </a:solidFill>
+                <a:latin typeface="Calibri" panose="020F0502020204030204" pitchFamily="34" charset="0"/>
+                <a:ea typeface="+mn-ea"/>
+                <a:cs typeface="+mn-cs"/>
+              </a:defRPr>
+            </a:lvl4pPr>
+            <a:lvl5pPr marL="1828800" algn="l" rtl="0" eaLnBrk="0" fontAlgn="base" hangingPunct="0">
+              <a:spcBef>
+                <a:spcPct val="0"/>
+              </a:spcBef>
+              <a:spcAft>
+                <a:spcPct val="0"/>
+              </a:spcAft>
+              <a:defRPr kern="1200">
+                <a:solidFill>
+                  <a:schemeClr val="tx1"/>
+                </a:solidFill>
+                <a:latin typeface="Calibri" panose="020F0502020204030204" pitchFamily="34" charset="0"/>
+                <a:ea typeface="+mn-ea"/>
+                <a:cs typeface="+mn-cs"/>
+              </a:defRPr>
+            </a:lvl5pPr>
+            <a:lvl6pPr marL="2286000" algn="l" defTabSz="914400" rtl="0" eaLnBrk="1" latinLnBrk="0" hangingPunct="1">
+              <a:defRPr kern="1200">
+                <a:solidFill>
+                  <a:schemeClr val="tx1"/>
+                </a:solidFill>
+                <a:latin typeface="Calibri" panose="020F0502020204030204" pitchFamily="34" charset="0"/>
+                <a:ea typeface="+mn-ea"/>
+                <a:cs typeface="+mn-cs"/>
+              </a:defRPr>
+            </a:lvl6pPr>
+            <a:lvl7pPr marL="2743200" algn="l" defTabSz="914400" rtl="0" eaLnBrk="1" latinLnBrk="0" hangingPunct="1">
+              <a:defRPr kern="1200">
+                <a:solidFill>
+                  <a:schemeClr val="tx1"/>
+                </a:solidFill>
+                <a:latin typeface="Calibri" panose="020F0502020204030204" pitchFamily="34" charset="0"/>
+                <a:ea typeface="+mn-ea"/>
+                <a:cs typeface="+mn-cs"/>
+              </a:defRPr>
+            </a:lvl7pPr>
+            <a:lvl8pPr marL="3200400" algn="l" defTabSz="914400" rtl="0" eaLnBrk="1" latinLnBrk="0" hangingPunct="1">
+              <a:defRPr kern="1200">
+                <a:solidFill>
+                  <a:schemeClr val="tx1"/>
+                </a:solidFill>
+                <a:latin typeface="Calibri" panose="020F0502020204030204" pitchFamily="34" charset="0"/>
+                <a:ea typeface="+mn-ea"/>
+                <a:cs typeface="+mn-cs"/>
+              </a:defRPr>
+            </a:lvl8pPr>
+            <a:lvl9pPr marL="3657600" algn="l" defTabSz="914400" rtl="0" eaLnBrk="1" latinLnBrk="0" hangingPunct="1">
+              <a:defRPr kern="1200">
+                <a:solidFill>
+                  <a:schemeClr val="tx1"/>
+                </a:solidFill>
+                <a:latin typeface="Calibri" panose="020F0502020204030204" pitchFamily="34" charset="0"/>
+                <a:ea typeface="+mn-ea"/>
+                <a:cs typeface="+mn-cs"/>
+              </a:defRPr>
+            </a:lvl9pPr>
           </a:lstStyle>
           <a:p>
-            <a:pPr algn="ctr" eaLnBrk="1" hangingPunct="1">
-              <a:defRPr/>
-            </a:pPr>
+            <a:pPr algn="ctr" eaLnBrk="1" hangingPunct="1"/>
             <a:r>
-              <a:rPr lang="en-US" altLang="en-US" sz="1000" i="1" dirty="0">
-                <a:latin typeface="Arial"/>
-                <a:cs typeface="Arial"/>
+              <a:rPr lang="en-US" altLang="en-US" sz="1200" dirty="0">
+                <a:latin typeface="Arial" panose="020B0604020202020204" pitchFamily="34" charset="0"/>
+                <a:ea typeface="Amazon Ember" panose="020B0603020204020204" pitchFamily="34" charset="0"/>
+                <a:cs typeface="Arial" panose="020B0604020202020204" pitchFamily="34" charset="0"/>
               </a:rPr>
-              <a:t>Request</a:t>
-            </a:r>
-          </a:p>
-          <a:p>
-            <a:pPr algn="ctr" eaLnBrk="1" hangingPunct="1">
-              <a:defRPr/>
-            </a:pPr>
-            <a:r>
-              <a:rPr lang="en-US" altLang="en-US" sz="1000" i="1" dirty="0">
-                <a:latin typeface="Arial"/>
-                <a:cs typeface="Arial"/>
-              </a:rPr>
-              <a:t>Video Data</a:t>
+              <a:t>(Web Server)</a:t>
             </a:r>
           </a:p>
         </p:txBody>
@@ -10707,7 +10021,7 @@
         </p:nvSpPr>
         <p:spPr>
           <a:xfrm>
-            <a:off x="7449718" y="285335"/>
+            <a:off x="1514499" y="3198726"/>
             <a:ext cx="290464" cy="323165"/>
           </a:xfrm>
           <a:prstGeom prst="rect">
@@ -10742,7 +10056,7 @@
                   <a:schemeClr val="tx1"/>
                 </a:solidFill>
               </a:rPr>
-              <a:t>1</a:t>
+              <a:t>7</a:t>
             </a:r>
             <a:endParaRPr lang="ko-KR" altLang="en-US" sz="1500" dirty="0">
               <a:solidFill>
@@ -10754,98 +10068,10 @@
       </p:sp>
       <p:sp>
         <p:nvSpPr>
-          <p:cNvPr id="147" name="label">
-            <a:extLst>
-              <a:ext uri="{FF2B5EF4-FFF2-40B4-BE49-F238E27FC236}">
-                <a16:creationId xmlns:a16="http://schemas.microsoft.com/office/drawing/2014/main" id="{A75C122B-1989-EA8E-E17C-D79108A6BF4D}"/>
-              </a:ext>
-            </a:extLst>
-          </p:cNvPr>
-          <p:cNvSpPr txBox="1">
-            <a:spLocks noChangeArrowheads="1"/>
-          </p:cNvSpPr>
-          <p:nvPr/>
-        </p:nvSpPr>
-        <p:spPr>
-          <a:xfrm>
-            <a:off x="5093547" y="568789"/>
-            <a:ext cx="1101582" cy="400110"/>
-          </a:xfrm>
-          <a:prstGeom prst="rect">
-            <a:avLst/>
-          </a:prstGeom>
-          <a:ln>
-            <a:noFill/>
-          </a:ln>
-        </p:spPr>
-        <p:style>
-          <a:lnRef idx="2">
-            <a:schemeClr val="dk1"/>
-          </a:lnRef>
-          <a:fillRef idx="1">
-            <a:schemeClr val="lt1"/>
-          </a:fillRef>
-          <a:effectRef idx="0">
-            <a:schemeClr val="dk1"/>
-          </a:effectRef>
-          <a:fontRef idx="minor">
-            <a:schemeClr val="dk1"/>
-          </a:fontRef>
-        </p:style>
-        <p:txBody>
-          <a:bodyPr wrap="square">
-            <a:spAutoFit/>
-          </a:bodyPr>
-          <a:lstStyle>
-            <a:lvl1pPr marL="0" indent="0">
-              <a:lnSpc>
-                <a:spcPct val="100000"/>
-              </a:lnSpc>
-              <a:spcBef>
-                <a:spcPct val="0"/>
-              </a:spcBef>
-              <a:spcAft>
-                <a:spcPts val="0"/>
-              </a:spcAft>
-              <a:defRPr kumimoji="0" sz="1800" b="0" i="0" u="none" strike="noStrike" kern="0" cap="none" spc="0" normalizeH="0" baseline="0">
-                <a:solidFill>
-                  <a:schemeClr val="tx1"/>
-                </a:solidFill>
-              </a:defRPr>
-            </a:lvl1pPr>
-          </a:lstStyle>
-          <a:p>
-            <a:pPr algn="ctr" eaLnBrk="1" hangingPunct="1">
-              <a:defRPr/>
-            </a:pPr>
-            <a:r>
-              <a:rPr lang="en-US" altLang="en-US" sz="1000" i="1" dirty="0">
-                <a:latin typeface="Arial"/>
-                <a:cs typeface="Arial"/>
-              </a:rPr>
-              <a:t>Response</a:t>
-            </a:r>
-          </a:p>
-          <a:p>
-            <a:pPr algn="ctr" eaLnBrk="1" hangingPunct="1">
-              <a:defRPr/>
-            </a:pPr>
-            <a:r>
-              <a:rPr lang="en-US" altLang="en-US" sz="1000" i="1" dirty="0">
-                <a:latin typeface="Arial"/>
-                <a:cs typeface="Arial"/>
-              </a:rPr>
-              <a:t>Feature Result</a:t>
-            </a:r>
-          </a:p>
-        </p:txBody>
-      </p:sp>
-      <p:sp>
-        <p:nvSpPr>
-          <p:cNvPr id="172" name="TextBox 171">
-            <a:extLst>
-              <a:ext uri="{FF2B5EF4-FFF2-40B4-BE49-F238E27FC236}">
-                <a16:creationId xmlns:a16="http://schemas.microsoft.com/office/drawing/2014/main" id="{72120E0D-E64C-6A28-3BEA-AAEFC17BDF64}"/>
+          <p:cNvPr id="173" name="TextBox 172">
+            <a:extLst>
+              <a:ext uri="{FF2B5EF4-FFF2-40B4-BE49-F238E27FC236}">
+                <a16:creationId xmlns:a16="http://schemas.microsoft.com/office/drawing/2014/main" id="{9279C484-B37C-B86A-2475-D74238FF1744}"/>
               </a:ext>
             </a:extLst>
           </p:cNvPr>
@@ -10854,7 +10080,7 @@
         </p:nvSpPr>
         <p:spPr>
           <a:xfrm>
-            <a:off x="5076801" y="270121"/>
+            <a:off x="4906828" y="3111483"/>
             <a:ext cx="290464" cy="323165"/>
           </a:xfrm>
           <a:prstGeom prst="rect">
@@ -10889,158 +10115,6 @@
                   <a:schemeClr val="tx1"/>
                 </a:solidFill>
               </a:rPr>
-              <a:t>3</a:t>
-            </a:r>
-            <a:endParaRPr lang="ko-KR" altLang="en-US" sz="1500" dirty="0">
-              <a:solidFill>
-                <a:schemeClr val="tx1"/>
-              </a:solidFill>
-            </a:endParaRPr>
-          </a:p>
-        </p:txBody>
-      </p:sp>
-      <p:sp>
-        <p:nvSpPr>
-          <p:cNvPr id="122" name="label">
-            <a:extLst>
-              <a:ext uri="{FF2B5EF4-FFF2-40B4-BE49-F238E27FC236}">
-                <a16:creationId xmlns:a16="http://schemas.microsoft.com/office/drawing/2014/main" id="{7B59D974-55EF-F737-5B86-15ED3C881EF9}"/>
-              </a:ext>
-            </a:extLst>
-          </p:cNvPr>
-          <p:cNvSpPr txBox="1">
-            <a:spLocks noChangeArrowheads="1"/>
-          </p:cNvSpPr>
-          <p:nvPr/>
-        </p:nvSpPr>
-        <p:spPr>
-          <a:xfrm>
-            <a:off x="9007632" y="232663"/>
-            <a:ext cx="1172413" cy="400110"/>
-          </a:xfrm>
-          <a:prstGeom prst="rect">
-            <a:avLst/>
-          </a:prstGeom>
-          <a:solidFill>
-            <a:schemeClr val="bg1"/>
-          </a:solidFill>
-          <a:ln>
-            <a:solidFill>
-              <a:schemeClr val="bg1"/>
-            </a:solidFill>
-          </a:ln>
-        </p:spPr>
-        <p:style>
-          <a:lnRef idx="2">
-            <a:schemeClr val="dk1"/>
-          </a:lnRef>
-          <a:fillRef idx="1">
-            <a:schemeClr val="lt1"/>
-          </a:fillRef>
-          <a:effectRef idx="0">
-            <a:schemeClr val="dk1"/>
-          </a:effectRef>
-          <a:fontRef idx="minor">
-            <a:schemeClr val="dk1"/>
-          </a:fontRef>
-        </p:style>
-        <p:txBody>
-          <a:bodyPr wrap="square">
-            <a:spAutoFit/>
-          </a:bodyPr>
-          <a:lstStyle>
-            <a:lvl1pPr marL="0" indent="0">
-              <a:lnSpc>
-                <a:spcPct val="100000"/>
-              </a:lnSpc>
-              <a:spcBef>
-                <a:spcPct val="0"/>
-              </a:spcBef>
-              <a:spcAft>
-                <a:spcPts val="0"/>
-              </a:spcAft>
-              <a:defRPr kumimoji="0" sz="1800" b="0" i="0" u="none" strike="noStrike" kern="0" cap="none" spc="0" normalizeH="0" baseline="0">
-                <a:solidFill>
-                  <a:schemeClr val="tx1"/>
-                </a:solidFill>
-              </a:defRPr>
-            </a:lvl1pPr>
-          </a:lstStyle>
-          <a:p>
-            <a:pPr algn="ctr" eaLnBrk="1" hangingPunct="1">
-              <a:defRPr/>
-            </a:pPr>
-            <a:r>
-              <a:rPr lang="en-US" altLang="en-US" sz="1000" i="1" dirty="0">
-                <a:latin typeface="Arial"/>
-                <a:cs typeface="Arial"/>
-              </a:rPr>
-              <a:t>Response</a:t>
-            </a:r>
-          </a:p>
-          <a:p>
-            <a:pPr algn="ctr" eaLnBrk="1" hangingPunct="1">
-              <a:defRPr/>
-            </a:pPr>
-            <a:r>
-              <a:rPr lang="en-US" altLang="en-US" sz="1000" i="1" dirty="0">
-                <a:latin typeface="Arial"/>
-                <a:cs typeface="Arial"/>
-              </a:rPr>
-              <a:t>Video Data</a:t>
-            </a:r>
-          </a:p>
-        </p:txBody>
-      </p:sp>
-      <p:sp>
-        <p:nvSpPr>
-          <p:cNvPr id="173" name="TextBox 172">
-            <a:extLst>
-              <a:ext uri="{FF2B5EF4-FFF2-40B4-BE49-F238E27FC236}">
-                <a16:creationId xmlns:a16="http://schemas.microsoft.com/office/drawing/2014/main" id="{9279C484-B37C-B86A-2475-D74238FF1744}"/>
-              </a:ext>
-            </a:extLst>
-          </p:cNvPr>
-          <p:cNvSpPr txBox="1"/>
-          <p:nvPr/>
-        </p:nvSpPr>
-        <p:spPr>
-          <a:xfrm>
-            <a:off x="8917449" y="53113"/>
-            <a:ext cx="290464" cy="323165"/>
-          </a:xfrm>
-          <a:prstGeom prst="rect">
-            <a:avLst/>
-          </a:prstGeom>
-        </p:spPr>
-        <p:style>
-          <a:lnRef idx="2">
-            <a:schemeClr val="accent4">
-              <a:shade val="15000"/>
-            </a:schemeClr>
-          </a:lnRef>
-          <a:fillRef idx="1">
-            <a:schemeClr val="accent4"/>
-          </a:fillRef>
-          <a:effectRef idx="0">
-            <a:schemeClr val="accent4"/>
-          </a:effectRef>
-          <a:fontRef idx="minor">
-            <a:schemeClr val="lt1"/>
-          </a:fontRef>
-        </p:style>
-        <p:txBody>
-          <a:bodyPr wrap="none" rtlCol="0">
-            <a:spAutoFit/>
-          </a:bodyPr>
-          <a:lstStyle/>
-          <a:p>
-            <a:r>
-              <a:rPr lang="en-US" altLang="ko-KR" sz="1500" dirty="0">
-                <a:solidFill>
-                  <a:schemeClr val="tx1"/>
-                </a:solidFill>
-              </a:rPr>
               <a:t>2</a:t>
             </a:r>
             <a:endParaRPr lang="ko-KR" altLang="en-US" sz="1500" dirty="0">
@@ -11051,65 +10125,6 @@
           </a:p>
         </p:txBody>
       </p:sp>
-      <p:sp>
-        <p:nvSpPr>
-          <p:cNvPr id="118" name="TextBox 117">
-            <a:extLst>
-              <a:ext uri="{FF2B5EF4-FFF2-40B4-BE49-F238E27FC236}">
-                <a16:creationId xmlns:a16="http://schemas.microsoft.com/office/drawing/2014/main" id="{E09E7382-15B9-1B4D-5370-1633A8949496}"/>
-              </a:ext>
-            </a:extLst>
-          </p:cNvPr>
-          <p:cNvSpPr txBox="1"/>
-          <p:nvPr/>
-        </p:nvSpPr>
-        <p:spPr>
-          <a:xfrm>
-            <a:off x="286030" y="3823978"/>
-            <a:ext cx="290464" cy="323165"/>
-          </a:xfrm>
-          <a:prstGeom prst="rect">
-            <a:avLst/>
-          </a:prstGeom>
-        </p:spPr>
-        <p:style>
-          <a:lnRef idx="2">
-            <a:schemeClr val="accent4">
-              <a:shade val="15000"/>
-            </a:schemeClr>
-          </a:lnRef>
-          <a:fillRef idx="1">
-            <a:schemeClr val="accent4"/>
-          </a:fillRef>
-          <a:effectRef idx="0">
-            <a:schemeClr val="accent4"/>
-          </a:effectRef>
-          <a:fontRef idx="minor">
-            <a:schemeClr val="lt1"/>
-          </a:fontRef>
-        </p:style>
-        <p:txBody>
-          <a:bodyPr wrap="none" rtlCol="0">
-            <a:spAutoFit/>
-          </a:bodyPr>
-          <a:lstStyle/>
-          <a:p>
-            <a:r>
-              <a:rPr lang="en-US" altLang="ko-KR" sz="1500" dirty="0">
-                <a:solidFill>
-                  <a:schemeClr val="tx1"/>
-                </a:solidFill>
-              </a:rPr>
-              <a:t>2</a:t>
-            </a:r>
-            <a:endParaRPr lang="ko-KR" altLang="en-US" sz="1500" dirty="0">
-              <a:solidFill>
-                <a:schemeClr val="tx1"/>
-              </a:solidFill>
-            </a:endParaRPr>
-          </a:p>
-        </p:txBody>
-      </p:sp>
       <p:grpSp>
         <p:nvGrpSpPr>
           <p:cNvPr id="14" name="Group 5" descr="Region group.">
@@ -11124,10 +10139,10 @@
         </p:nvGrpSpPr>
         <p:grpSpPr>
           <a:xfrm>
-            <a:off x="3620769" y="1800343"/>
-            <a:ext cx="5898184" cy="2384306"/>
-            <a:chOff x="4215623" y="1512745"/>
-            <a:chExt cx="5898184" cy="2384306"/>
+            <a:off x="3420916" y="1324791"/>
+            <a:ext cx="5899771" cy="2390656"/>
+            <a:chOff x="4214036" y="1506395"/>
+            <a:chExt cx="5899771" cy="2390656"/>
           </a:xfrm>
         </p:grpSpPr>
         <p:sp>
@@ -11151,11 +10166,11 @@
               <a:avLst/>
             </a:prstGeom>
             <a:noFill/>
-            <a:ln w="15875">
+            <a:ln w="12700">
               <a:solidFill>
                 <a:srgbClr val="00A4A6"/>
               </a:solidFill>
-              <a:prstDash val="sysDash"/>
+              <a:prstDash val="dash"/>
             </a:ln>
           </p:spPr>
           <p:style>
@@ -11215,10 +10230,10 @@
             <p:nvPr/>
           </p:nvPicPr>
           <p:blipFill>
-            <a:blip r:embed="rId14">
+            <a:blip r:embed="rId12">
               <a:extLst>
                 <a:ext uri="{96DAC541-7B7A-43D3-8B79-37D633B846F1}">
-                  <asvg:svgBlip xmlns:asvg="http://schemas.microsoft.com/office/drawing/2016/SVG/main" r:embed="rId15"/>
+                  <asvg:svgBlip xmlns:asvg="http://schemas.microsoft.com/office/drawing/2016/SVG/main" r:embed="rId13"/>
                 </a:ext>
               </a:extLst>
             </a:blip>
@@ -11227,7 +10242,7 @@
           </p:blipFill>
           <p:spPr>
             <a:xfrm>
-              <a:off x="4215623" y="1512745"/>
+              <a:off x="4214036" y="1506395"/>
               <a:ext cx="381000" cy="381000"/>
             </a:xfrm>
             <a:prstGeom prst="rect">
@@ -11250,7 +10265,7 @@
         </p:nvGrpSpPr>
         <p:grpSpPr>
           <a:xfrm>
-            <a:off x="5194497" y="2767578"/>
+            <a:off x="5695193" y="2296742"/>
             <a:ext cx="722695" cy="640788"/>
             <a:chOff x="777009" y="4816476"/>
             <a:chExt cx="1683617" cy="1492803"/>
@@ -11271,7 +10286,7 @@
             <p:nvPr/>
           </p:nvPicPr>
           <p:blipFill rotWithShape="1">
-            <a:blip r:embed="rId16">
+            <a:blip r:embed="rId14">
               <a:extLst>
                 <a:ext uri="{28A0092B-C50C-407E-A947-70E740481C1C}">
                   <a14:useLocalDpi xmlns:a14="http://schemas.microsoft.com/office/drawing/2010/main" val="0"/>
@@ -11306,7 +10321,7 @@
             <p:nvPr/>
           </p:nvPicPr>
           <p:blipFill rotWithShape="1">
-            <a:blip r:embed="rId16">
+            <a:blip r:embed="rId14">
               <a:extLst>
                 <a:ext uri="{28A0092B-C50C-407E-A947-70E740481C1C}">
                   <a14:useLocalDpi xmlns:a14="http://schemas.microsoft.com/office/drawing/2010/main" val="0"/>
@@ -11342,10 +10357,10 @@
           <p:nvPr/>
         </p:nvPicPr>
         <p:blipFill>
-          <a:blip r:embed="rId17">
+          <a:blip r:embed="rId15">
             <a:extLst>
               <a:ext uri="{96DAC541-7B7A-43D3-8B79-37D633B846F1}">
-                <asvg:svgBlip xmlns:asvg="http://schemas.microsoft.com/office/drawing/2016/SVG/main" r:embed="rId18"/>
+                <asvg:svgBlip xmlns:asvg="http://schemas.microsoft.com/office/drawing/2016/SVG/main" r:embed="rId16"/>
               </a:ext>
             </a:extLst>
           </a:blip>
@@ -11354,7 +10369,7 @@
         </p:blipFill>
         <p:spPr>
           <a:xfrm>
-            <a:off x="4081680" y="2224682"/>
+            <a:off x="3883414" y="1753099"/>
             <a:ext cx="381000" cy="381000"/>
           </a:xfrm>
           <a:prstGeom prst="rect">
@@ -11377,7 +10392,7 @@
           <p:nvPr/>
         </p:nvPicPr>
         <p:blipFill>
-          <a:blip r:embed="rId19">
+          <a:blip r:embed="rId17">
             <a:extLst>
               <a:ext uri="{28A0092B-C50C-407E-A947-70E740481C1C}">
                 <a14:useLocalDpi xmlns:a14="http://schemas.microsoft.com/office/drawing/2010/main" val="0"/>
@@ -11390,8 +10405,8 @@
         </p:blipFill>
         <p:spPr>
           <a:xfrm>
-            <a:off x="6121685" y="2625589"/>
-            <a:ext cx="2075537" cy="748654"/>
+            <a:off x="6373153" y="2486374"/>
+            <a:ext cx="1912481" cy="689839"/>
           </a:xfrm>
           <a:prstGeom prst="rect">
             <a:avLst/>
@@ -11413,7 +10428,7 @@
           <p:nvPr/>
         </p:nvPicPr>
         <p:blipFill rotWithShape="1">
-          <a:blip r:embed="rId20">
+          <a:blip r:embed="rId18">
             <a:extLst>
               <a:ext uri="{28A0092B-C50C-407E-A947-70E740481C1C}">
                 <a14:useLocalDpi xmlns:a14="http://schemas.microsoft.com/office/drawing/2010/main" val="0"/>
@@ -11425,7 +10440,7 @@
         </p:blipFill>
         <p:spPr bwMode="auto">
           <a:xfrm>
-            <a:off x="6413407" y="2387816"/>
+            <a:off x="6538100" y="2239814"/>
             <a:ext cx="1582588" cy="482578"/>
           </a:xfrm>
           <a:prstGeom prst="rect">
@@ -11443,6 +10458,2139 @@
           </a:extLst>
         </p:spPr>
       </p:pic>
+      <p:grpSp>
+        <p:nvGrpSpPr>
+          <p:cNvPr id="20" name="그룹 19">
+            <a:extLst>
+              <a:ext uri="{FF2B5EF4-FFF2-40B4-BE49-F238E27FC236}">
+                <a16:creationId xmlns:a16="http://schemas.microsoft.com/office/drawing/2014/main" id="{BA950A9F-AD6C-51C2-3473-6F1027AD4822}"/>
+              </a:ext>
+            </a:extLst>
+          </p:cNvPr>
+          <p:cNvGrpSpPr/>
+          <p:nvPr/>
+        </p:nvGrpSpPr>
+        <p:grpSpPr>
+          <a:xfrm>
+            <a:off x="5669920" y="537177"/>
+            <a:ext cx="1403350" cy="734199"/>
+            <a:chOff x="5730650" y="914126"/>
+            <a:chExt cx="1403350" cy="734199"/>
+          </a:xfrm>
+        </p:grpSpPr>
+        <p:sp>
+          <p:nvSpPr>
+            <p:cNvPr id="10" name="background">
+              <a:extLst>
+                <a:ext uri="{FF2B5EF4-FFF2-40B4-BE49-F238E27FC236}">
+                  <a16:creationId xmlns:a16="http://schemas.microsoft.com/office/drawing/2014/main" id="{6DC7C872-C0C3-D281-777E-8960CDF60AAC}"/>
+                </a:ext>
+                <a:ext uri="{C183D7F6-B498-43B3-948B-1728B52AA6E4}">
+                  <adec:decorative xmlns:adec="http://schemas.microsoft.com/office/drawing/2017/decorative" val="1"/>
+                </a:ext>
+              </a:extLst>
+            </p:cNvPr>
+            <p:cNvSpPr/>
+            <p:nvPr/>
+          </p:nvSpPr>
+          <p:spPr>
+            <a:xfrm>
+              <a:off x="6221835" y="927519"/>
+              <a:ext cx="413413" cy="421496"/>
+            </a:xfrm>
+            <a:prstGeom prst="ellipse">
+              <a:avLst/>
+            </a:prstGeom>
+            <a:solidFill>
+              <a:schemeClr val="bg1"/>
+            </a:solidFill>
+            <a:ln>
+              <a:noFill/>
+            </a:ln>
+          </p:spPr>
+          <p:style>
+            <a:lnRef idx="2">
+              <a:schemeClr val="accent1">
+                <a:shade val="50000"/>
+              </a:schemeClr>
+            </a:lnRef>
+            <a:fillRef idx="1">
+              <a:schemeClr val="accent1"/>
+            </a:fillRef>
+            <a:effectRef idx="0">
+              <a:schemeClr val="accent1"/>
+            </a:effectRef>
+            <a:fontRef idx="minor">
+              <a:schemeClr val="lt1"/>
+            </a:fontRef>
+          </p:style>
+          <p:txBody>
+            <a:bodyPr rtlCol="0" anchor="ctr"/>
+            <a:lstStyle/>
+            <a:p>
+              <a:pPr algn="ctr"/>
+              <a:endParaRPr lang="en-US"/>
+            </a:p>
+          </p:txBody>
+        </p:sp>
+        <p:grpSp>
+          <p:nvGrpSpPr>
+            <p:cNvPr id="13" name="Group 5" descr="Internet gateway service icon on VPC container.">
+              <a:extLst>
+                <a:ext uri="{FF2B5EF4-FFF2-40B4-BE49-F238E27FC236}">
+                  <a16:creationId xmlns:a16="http://schemas.microsoft.com/office/drawing/2014/main" id="{2D5A2515-AFB2-D3E5-F912-AB75EFCA0478}"/>
+                </a:ext>
+              </a:extLst>
+            </p:cNvPr>
+            <p:cNvGrpSpPr/>
+            <p:nvPr/>
+          </p:nvGrpSpPr>
+          <p:grpSpPr>
+            <a:xfrm>
+              <a:off x="5730650" y="914126"/>
+              <a:ext cx="1403350" cy="734199"/>
+              <a:chOff x="7328508" y="1855841"/>
+              <a:chExt cx="1403350" cy="734199"/>
+            </a:xfrm>
+          </p:grpSpPr>
+          <p:pic>
+            <p:nvPicPr>
+              <p:cNvPr id="17" name="Graphic 10" descr="Internet gateway resource icon for the Amazon VPC service.">
+                <a:extLst>
+                  <a:ext uri="{FF2B5EF4-FFF2-40B4-BE49-F238E27FC236}">
+                    <a16:creationId xmlns:a16="http://schemas.microsoft.com/office/drawing/2014/main" id="{160AAE6C-940A-33DF-0A79-DBE3B38EACF4}"/>
+                  </a:ext>
+                </a:extLst>
+              </p:cNvPr>
+              <p:cNvPicPr>
+                <a:picLocks noChangeAspect="1" noChangeArrowheads="1"/>
+              </p:cNvPicPr>
+              <p:nvPr/>
+            </p:nvPicPr>
+            <p:blipFill>
+              <a:blip r:embed="rId19">
+                <a:extLst>
+                  <a:ext uri="{96DAC541-7B7A-43D3-8B79-37D633B846F1}">
+                    <asvg:svgBlip xmlns:asvg="http://schemas.microsoft.com/office/drawing/2016/SVG/main" r:embed="rId20"/>
+                  </a:ext>
+                </a:extLst>
+              </a:blip>
+              <a:srcRect/>
+              <a:stretch/>
+            </p:blipFill>
+            <p:spPr bwMode="auto">
+              <a:xfrm>
+                <a:off x="7799044" y="1855841"/>
+                <a:ext cx="457200" cy="457200"/>
+              </a:xfrm>
+              <a:prstGeom prst="rect">
+                <a:avLst/>
+              </a:prstGeom>
+              <a:noFill/>
+              <a:ln>
+                <a:noFill/>
+              </a:ln>
+              <a:extLst>
+                <a:ext uri="{909E8E84-426E-40DD-AFC4-6F175D3DCCD1}">
+                  <a14:hiddenFill xmlns:a14="http://schemas.microsoft.com/office/drawing/2010/main">
+                    <a:solidFill>
+                      <a:srgbClr val="FFFFFF"/>
+                    </a:solidFill>
+                  </a14:hiddenFill>
+                </a:ext>
+                <a:ext uri="{91240B29-F687-4F45-9708-019B960494DF}">
+                  <a14:hiddenLine xmlns:a14="http://schemas.microsoft.com/office/drawing/2010/main" w="9525">
+                    <a:solidFill>
+                      <a:srgbClr val="000000"/>
+                    </a:solidFill>
+                    <a:miter lim="800000"/>
+                    <a:headEnd/>
+                    <a:tailEnd/>
+                  </a14:hiddenLine>
+                </a:ext>
+              </a:extLst>
+            </p:spPr>
+          </p:pic>
+          <p:sp>
+            <p:nvSpPr>
+              <p:cNvPr id="18" name="TextBox 12">
+                <a:extLst>
+                  <a:ext uri="{FF2B5EF4-FFF2-40B4-BE49-F238E27FC236}">
+                    <a16:creationId xmlns:a16="http://schemas.microsoft.com/office/drawing/2014/main" id="{78242EA7-7D76-3817-0232-AF186A00193B}"/>
+                  </a:ext>
+                </a:extLst>
+              </p:cNvPr>
+              <p:cNvSpPr txBox="1">
+                <a:spLocks noChangeArrowheads="1"/>
+              </p:cNvSpPr>
+              <p:nvPr/>
+            </p:nvSpPr>
+            <p:spPr bwMode="auto">
+              <a:xfrm>
+                <a:off x="7328508" y="2313041"/>
+                <a:ext cx="1403350" cy="276999"/>
+              </a:xfrm>
+              <a:prstGeom prst="rect">
+                <a:avLst/>
+              </a:prstGeom>
+              <a:noFill/>
+              <a:ln>
+                <a:noFill/>
+              </a:ln>
+              <a:extLst>
+                <a:ext uri="{909E8E84-426E-40DD-AFC4-6F175D3DCCD1}">
+                  <a14:hiddenFill xmlns:a14="http://schemas.microsoft.com/office/drawing/2010/main">
+                    <a:solidFill>
+                      <a:srgbClr val="FFFFFF"/>
+                    </a:solidFill>
+                  </a14:hiddenFill>
+                </a:ext>
+                <a:ext uri="{91240B29-F687-4F45-9708-019B960494DF}">
+                  <a14:hiddenLine xmlns:a14="http://schemas.microsoft.com/office/drawing/2010/main" w="9525">
+                    <a:solidFill>
+                      <a:srgbClr val="000000"/>
+                    </a:solidFill>
+                    <a:miter lim="800000"/>
+                    <a:headEnd/>
+                    <a:tailEnd/>
+                  </a14:hiddenLine>
+                </a:ext>
+              </a:extLst>
+            </p:spPr>
+            <p:txBody>
+              <a:bodyPr>
+                <a:spAutoFit/>
+              </a:bodyPr>
+              <a:lstStyle>
+                <a:lvl1pPr>
+                  <a:defRPr>
+                    <a:solidFill>
+                      <a:schemeClr val="tx1"/>
+                    </a:solidFill>
+                    <a:latin typeface="Calibri" panose="020F0502020204030204" pitchFamily="34" charset="0"/>
+                  </a:defRPr>
+                </a:lvl1pPr>
+                <a:lvl2pPr marL="742950" indent="-285750">
+                  <a:defRPr>
+                    <a:solidFill>
+                      <a:schemeClr val="tx1"/>
+                    </a:solidFill>
+                    <a:latin typeface="Calibri" panose="020F0502020204030204" pitchFamily="34" charset="0"/>
+                  </a:defRPr>
+                </a:lvl2pPr>
+                <a:lvl3pPr marL="1143000" indent="-228600">
+                  <a:defRPr>
+                    <a:solidFill>
+                      <a:schemeClr val="tx1"/>
+                    </a:solidFill>
+                    <a:latin typeface="Calibri" panose="020F0502020204030204" pitchFamily="34" charset="0"/>
+                  </a:defRPr>
+                </a:lvl3pPr>
+                <a:lvl4pPr marL="1600200" indent="-228600">
+                  <a:defRPr>
+                    <a:solidFill>
+                      <a:schemeClr val="tx1"/>
+                    </a:solidFill>
+                    <a:latin typeface="Calibri" panose="020F0502020204030204" pitchFamily="34" charset="0"/>
+                  </a:defRPr>
+                </a:lvl4pPr>
+                <a:lvl5pPr marL="2057400" indent="-228600">
+                  <a:defRPr>
+                    <a:solidFill>
+                      <a:schemeClr val="tx1"/>
+                    </a:solidFill>
+                    <a:latin typeface="Calibri" panose="020F0502020204030204" pitchFamily="34" charset="0"/>
+                  </a:defRPr>
+                </a:lvl5pPr>
+                <a:lvl6pPr marL="2514600" indent="-228600" eaLnBrk="0" fontAlgn="base" hangingPunct="0">
+                  <a:spcBef>
+                    <a:spcPct val="0"/>
+                  </a:spcBef>
+                  <a:spcAft>
+                    <a:spcPct val="0"/>
+                  </a:spcAft>
+                  <a:defRPr>
+                    <a:solidFill>
+                      <a:schemeClr val="tx1"/>
+                    </a:solidFill>
+                    <a:latin typeface="Calibri" panose="020F0502020204030204" pitchFamily="34" charset="0"/>
+                  </a:defRPr>
+                </a:lvl6pPr>
+                <a:lvl7pPr marL="2971800" indent="-228600" eaLnBrk="0" fontAlgn="base" hangingPunct="0">
+                  <a:spcBef>
+                    <a:spcPct val="0"/>
+                  </a:spcBef>
+                  <a:spcAft>
+                    <a:spcPct val="0"/>
+                  </a:spcAft>
+                  <a:defRPr>
+                    <a:solidFill>
+                      <a:schemeClr val="tx1"/>
+                    </a:solidFill>
+                    <a:latin typeface="Calibri" panose="020F0502020204030204" pitchFamily="34" charset="0"/>
+                  </a:defRPr>
+                </a:lvl7pPr>
+                <a:lvl8pPr marL="3429000" indent="-228600" eaLnBrk="0" fontAlgn="base" hangingPunct="0">
+                  <a:spcBef>
+                    <a:spcPct val="0"/>
+                  </a:spcBef>
+                  <a:spcAft>
+                    <a:spcPct val="0"/>
+                  </a:spcAft>
+                  <a:defRPr>
+                    <a:solidFill>
+                      <a:schemeClr val="tx1"/>
+                    </a:solidFill>
+                    <a:latin typeface="Calibri" panose="020F0502020204030204" pitchFamily="34" charset="0"/>
+                  </a:defRPr>
+                </a:lvl8pPr>
+                <a:lvl9pPr marL="3886200" indent="-228600" eaLnBrk="0" fontAlgn="base" hangingPunct="0">
+                  <a:spcBef>
+                    <a:spcPct val="0"/>
+                  </a:spcBef>
+                  <a:spcAft>
+                    <a:spcPct val="0"/>
+                  </a:spcAft>
+                  <a:defRPr>
+                    <a:solidFill>
+                      <a:schemeClr val="tx1"/>
+                    </a:solidFill>
+                    <a:latin typeface="Calibri" panose="020F0502020204030204" pitchFamily="34" charset="0"/>
+                  </a:defRPr>
+                </a:lvl9pPr>
+              </a:lstStyle>
+              <a:p>
+                <a:pPr algn="ctr" eaLnBrk="1" hangingPunct="1"/>
+                <a:r>
+                  <a:rPr lang="en-US" altLang="en-US" sz="1200" dirty="0">
+                    <a:latin typeface="Arial" panose="020B0604020202020204" pitchFamily="34" charset="0"/>
+                    <a:ea typeface="Amazon Ember" panose="020B0603020204020204" pitchFamily="34" charset="0"/>
+                    <a:cs typeface="Arial" panose="020B0604020202020204" pitchFamily="34" charset="0"/>
+                  </a:rPr>
+                  <a:t>Internet gateway</a:t>
+                </a:r>
+              </a:p>
+            </p:txBody>
+          </p:sp>
+        </p:grpSp>
+      </p:grpSp>
+      <p:pic>
+        <p:nvPicPr>
+          <p:cNvPr id="19" name="Graphic 46" descr="Instance instance icon for the Amazon EC2 service.">
+            <a:extLst>
+              <a:ext uri="{FF2B5EF4-FFF2-40B4-BE49-F238E27FC236}">
+                <a16:creationId xmlns:a16="http://schemas.microsoft.com/office/drawing/2014/main" id="{62085753-DD38-4579-5901-C535C2B4CAAD}"/>
+              </a:ext>
+            </a:extLst>
+          </p:cNvPr>
+          <p:cNvPicPr>
+            <a:picLocks noChangeAspect="1"/>
+          </p:cNvPicPr>
+          <p:nvPr/>
+        </p:nvPicPr>
+        <p:blipFill>
+          <a:blip r:embed="rId21">
+            <a:extLst>
+              <a:ext uri="{96DAC541-7B7A-43D3-8B79-37D633B846F1}">
+                <asvg:svgBlip xmlns:asvg="http://schemas.microsoft.com/office/drawing/2016/SVG/main" r:embed="rId22"/>
+              </a:ext>
+            </a:extLst>
+          </a:blip>
+          <a:stretch>
+            <a:fillRect/>
+          </a:stretch>
+        </p:blipFill>
+        <p:spPr>
+          <a:xfrm>
+            <a:off x="4943919" y="2248135"/>
+            <a:ext cx="705600" cy="705600"/>
+          </a:xfrm>
+          <a:prstGeom prst="rect">
+            <a:avLst/>
+          </a:prstGeom>
+        </p:spPr>
+      </p:pic>
+      <p:cxnSp>
+        <p:nvCxnSpPr>
+          <p:cNvPr id="36" name="직선 화살표 연결선 35">
+            <a:extLst>
+              <a:ext uri="{FF2B5EF4-FFF2-40B4-BE49-F238E27FC236}">
+                <a16:creationId xmlns:a16="http://schemas.microsoft.com/office/drawing/2014/main" id="{03F92505-CFA9-6903-CF98-0E1CD873B462}"/>
+              </a:ext>
+            </a:extLst>
+          </p:cNvPr>
+          <p:cNvCxnSpPr>
+            <a:cxnSpLocks/>
+          </p:cNvCxnSpPr>
+          <p:nvPr/>
+        </p:nvCxnSpPr>
+        <p:spPr>
+          <a:xfrm>
+            <a:off x="5305217" y="3246598"/>
+            <a:ext cx="0" cy="1033731"/>
+          </a:xfrm>
+          <a:prstGeom prst="straightConnector1">
+            <a:avLst/>
+          </a:prstGeom>
+          <a:ln w="19050">
+            <a:solidFill>
+              <a:srgbClr val="7AA116"/>
+            </a:solidFill>
+            <a:tailEnd type="triangle"/>
+          </a:ln>
+        </p:spPr>
+        <p:style>
+          <a:lnRef idx="1">
+            <a:schemeClr val="accent1"/>
+          </a:lnRef>
+          <a:fillRef idx="0">
+            <a:schemeClr val="accent1"/>
+          </a:fillRef>
+          <a:effectRef idx="0">
+            <a:schemeClr val="accent1"/>
+          </a:effectRef>
+          <a:fontRef idx="minor">
+            <a:schemeClr val="tx1"/>
+          </a:fontRef>
+        </p:style>
+      </p:cxnSp>
+      <p:cxnSp>
+        <p:nvCxnSpPr>
+          <p:cNvPr id="40" name="직선 화살표 연결선 39">
+            <a:extLst>
+              <a:ext uri="{FF2B5EF4-FFF2-40B4-BE49-F238E27FC236}">
+                <a16:creationId xmlns:a16="http://schemas.microsoft.com/office/drawing/2014/main" id="{866A3A3D-4305-2133-5393-C17F95C0E33D}"/>
+              </a:ext>
+            </a:extLst>
+          </p:cNvPr>
+          <p:cNvCxnSpPr>
+            <a:cxnSpLocks/>
+            <a:stCxn id="48" idx="3"/>
+            <a:endCxn id="4" idx="1"/>
+          </p:cNvCxnSpPr>
+          <p:nvPr/>
+        </p:nvCxnSpPr>
+        <p:spPr>
+          <a:xfrm flipV="1">
+            <a:off x="5660896" y="4449421"/>
+            <a:ext cx="951323" cy="3673"/>
+          </a:xfrm>
+          <a:prstGeom prst="straightConnector1">
+            <a:avLst/>
+          </a:prstGeom>
+          <a:ln w="19050">
+            <a:solidFill>
+              <a:schemeClr val="accent6"/>
+            </a:solidFill>
+            <a:tailEnd type="triangle"/>
+          </a:ln>
+        </p:spPr>
+        <p:style>
+          <a:lnRef idx="1">
+            <a:schemeClr val="accent1"/>
+          </a:lnRef>
+          <a:fillRef idx="0">
+            <a:schemeClr val="accent1"/>
+          </a:fillRef>
+          <a:effectRef idx="0">
+            <a:schemeClr val="accent1"/>
+          </a:effectRef>
+          <a:fontRef idx="minor">
+            <a:schemeClr val="tx1"/>
+          </a:fontRef>
+        </p:style>
+      </p:cxnSp>
+      <p:grpSp>
+        <p:nvGrpSpPr>
+          <p:cNvPr id="59" name="그룹 58">
+            <a:extLst>
+              <a:ext uri="{FF2B5EF4-FFF2-40B4-BE49-F238E27FC236}">
+                <a16:creationId xmlns:a16="http://schemas.microsoft.com/office/drawing/2014/main" id="{D57DDEF0-5154-7EAA-67A3-129550B294F4}"/>
+              </a:ext>
+            </a:extLst>
+          </p:cNvPr>
+          <p:cNvGrpSpPr/>
+          <p:nvPr/>
+        </p:nvGrpSpPr>
+        <p:grpSpPr>
+          <a:xfrm>
+            <a:off x="10400770" y="2212644"/>
+            <a:ext cx="1506538" cy="689870"/>
+            <a:chOff x="634119" y="3078325"/>
+            <a:chExt cx="1506538" cy="689870"/>
+          </a:xfrm>
+        </p:grpSpPr>
+        <p:pic>
+          <p:nvPicPr>
+            <p:cNvPr id="60" name="Graphic 6" descr="General resource icon.">
+              <a:extLst>
+                <a:ext uri="{FF2B5EF4-FFF2-40B4-BE49-F238E27FC236}">
+                  <a16:creationId xmlns:a16="http://schemas.microsoft.com/office/drawing/2014/main" id="{876E61A6-216C-75C1-B473-3DDDFE12435F}"/>
+                </a:ext>
+              </a:extLst>
+            </p:cNvPr>
+            <p:cNvPicPr>
+              <a:picLocks noChangeAspect="1" noChangeArrowheads="1"/>
+            </p:cNvPicPr>
+            <p:nvPr/>
+          </p:nvPicPr>
+          <p:blipFill rotWithShape="1">
+            <a:blip r:embed="rId2"/>
+            <a:srcRect/>
+            <a:stretch>
+              <a:fillRect/>
+            </a:stretch>
+          </p:blipFill>
+          <p:spPr>
+            <a:xfrm flipH="1">
+              <a:off x="1147583" y="3078325"/>
+              <a:ext cx="469900" cy="469900"/>
+            </a:xfrm>
+            <a:prstGeom prst="rect">
+              <a:avLst/>
+            </a:prstGeom>
+            <a:noFill/>
+            <a:ln>
+              <a:noFill/>
+            </a:ln>
+          </p:spPr>
+        </p:pic>
+        <p:sp>
+          <p:nvSpPr>
+            <p:cNvPr id="62" name="label6">
+              <a:extLst>
+                <a:ext uri="{FF2B5EF4-FFF2-40B4-BE49-F238E27FC236}">
+                  <a16:creationId xmlns:a16="http://schemas.microsoft.com/office/drawing/2014/main" id="{59694468-C07D-991F-6EDC-4F8AA3B4AE5E}"/>
+                </a:ext>
+              </a:extLst>
+            </p:cNvPr>
+            <p:cNvSpPr txBox="1">
+              <a:spLocks noChangeArrowheads="1"/>
+            </p:cNvSpPr>
+            <p:nvPr/>
+          </p:nvSpPr>
+          <p:spPr>
+            <a:xfrm>
+              <a:off x="634119" y="3491196"/>
+              <a:ext cx="1506538" cy="276999"/>
+            </a:xfrm>
+            <a:prstGeom prst="rect">
+              <a:avLst/>
+            </a:prstGeom>
+            <a:noFill/>
+            <a:ln>
+              <a:noFill/>
+            </a:ln>
+          </p:spPr>
+          <p:txBody>
+            <a:bodyPr>
+              <a:spAutoFit/>
+            </a:bodyPr>
+            <a:lstStyle>
+              <a:lvl1pPr marL="0" indent="0">
+                <a:lnSpc>
+                  <a:spcPct val="100000"/>
+                </a:lnSpc>
+                <a:spcBef>
+                  <a:spcPct val="0"/>
+                </a:spcBef>
+                <a:spcAft>
+                  <a:spcPts val="0"/>
+                </a:spcAft>
+                <a:defRPr kumimoji="0" sz="1800" b="0" i="0" u="none" strike="noStrike" kern="0" cap="none" spc="0" normalizeH="0" baseline="0">
+                  <a:solidFill>
+                    <a:schemeClr val="tx1"/>
+                  </a:solidFill>
+                  <a:latin typeface="Calibri"/>
+                </a:defRPr>
+              </a:lvl1pPr>
+            </a:lstStyle>
+            <a:p>
+              <a:pPr algn="ctr" eaLnBrk="1" hangingPunct="1">
+                <a:defRPr/>
+              </a:pPr>
+              <a:r>
+                <a:rPr lang="en-US" altLang="en-US" sz="1200" dirty="0">
+                  <a:latin typeface="Arial"/>
+                  <a:cs typeface="Arial"/>
+                </a:rPr>
+                <a:t>Developers</a:t>
+              </a:r>
+            </a:p>
+          </p:txBody>
+        </p:sp>
+      </p:grpSp>
+      <p:cxnSp>
+        <p:nvCxnSpPr>
+          <p:cNvPr id="64" name="연결선: 꺾임 63">
+            <a:extLst>
+              <a:ext uri="{FF2B5EF4-FFF2-40B4-BE49-F238E27FC236}">
+                <a16:creationId xmlns:a16="http://schemas.microsoft.com/office/drawing/2014/main" id="{DA22F451-9BBC-ABDA-A451-AC68CFF8E421}"/>
+              </a:ext>
+            </a:extLst>
+          </p:cNvPr>
+          <p:cNvCxnSpPr>
+            <a:cxnSpLocks/>
+            <a:stCxn id="62" idx="2"/>
+            <a:endCxn id="50" idx="3"/>
+          </p:cNvCxnSpPr>
+          <p:nvPr/>
+        </p:nvCxnSpPr>
+        <p:spPr>
+          <a:xfrm rot="5400000">
+            <a:off x="8563094" y="3327327"/>
+            <a:ext cx="3015758" cy="2166133"/>
+          </a:xfrm>
+          <a:prstGeom prst="bentConnector2">
+            <a:avLst/>
+          </a:prstGeom>
+          <a:ln w="19050">
+            <a:solidFill>
+              <a:srgbClr val="FFC000"/>
+            </a:solidFill>
+            <a:prstDash val="sysDash"/>
+            <a:tailEnd type="triangle"/>
+          </a:ln>
+        </p:spPr>
+        <p:style>
+          <a:lnRef idx="1">
+            <a:schemeClr val="accent1"/>
+          </a:lnRef>
+          <a:fillRef idx="0">
+            <a:schemeClr val="accent1"/>
+          </a:fillRef>
+          <a:effectRef idx="0">
+            <a:schemeClr val="accent1"/>
+          </a:effectRef>
+          <a:fontRef idx="minor">
+            <a:schemeClr val="tx1"/>
+          </a:fontRef>
+        </p:style>
+      </p:cxnSp>
+      <p:cxnSp>
+        <p:nvCxnSpPr>
+          <p:cNvPr id="66" name="직선 화살표 연결선 65">
+            <a:extLst>
+              <a:ext uri="{FF2B5EF4-FFF2-40B4-BE49-F238E27FC236}">
+                <a16:creationId xmlns:a16="http://schemas.microsoft.com/office/drawing/2014/main" id="{5A1F197A-EC52-DFC0-524F-AF1DBE7B5FB9}"/>
+              </a:ext>
+            </a:extLst>
+          </p:cNvPr>
+          <p:cNvCxnSpPr>
+            <a:cxnSpLocks/>
+          </p:cNvCxnSpPr>
+          <p:nvPr/>
+        </p:nvCxnSpPr>
+        <p:spPr>
+          <a:xfrm flipH="1">
+            <a:off x="8772588" y="2447594"/>
+            <a:ext cx="1996440" cy="0"/>
+          </a:xfrm>
+          <a:prstGeom prst="straightConnector1">
+            <a:avLst/>
+          </a:prstGeom>
+          <a:ln w="19050">
+            <a:solidFill>
+              <a:srgbClr val="FFC000"/>
+            </a:solidFill>
+            <a:prstDash val="sysDash"/>
+            <a:tailEnd type="triangle"/>
+          </a:ln>
+        </p:spPr>
+        <p:style>
+          <a:lnRef idx="1">
+            <a:schemeClr val="accent1"/>
+          </a:lnRef>
+          <a:fillRef idx="0">
+            <a:schemeClr val="accent1"/>
+          </a:fillRef>
+          <a:effectRef idx="0">
+            <a:schemeClr val="accent1"/>
+          </a:effectRef>
+          <a:fontRef idx="minor">
+            <a:schemeClr val="tx1"/>
+          </a:fontRef>
+        </p:style>
+      </p:cxnSp>
+      <p:cxnSp>
+        <p:nvCxnSpPr>
+          <p:cNvPr id="85" name="직선 화살표 연결선 84">
+            <a:extLst>
+              <a:ext uri="{FF2B5EF4-FFF2-40B4-BE49-F238E27FC236}">
+                <a16:creationId xmlns:a16="http://schemas.microsoft.com/office/drawing/2014/main" id="{C59C843E-D607-F67C-5253-91D9EB3E0511}"/>
+              </a:ext>
+            </a:extLst>
+          </p:cNvPr>
+          <p:cNvCxnSpPr>
+            <a:cxnSpLocks/>
+          </p:cNvCxnSpPr>
+          <p:nvPr/>
+        </p:nvCxnSpPr>
+        <p:spPr>
+          <a:xfrm flipH="1">
+            <a:off x="1153251" y="2845255"/>
+            <a:ext cx="2961612" cy="0"/>
+          </a:xfrm>
+          <a:prstGeom prst="straightConnector1">
+            <a:avLst/>
+          </a:prstGeom>
+          <a:ln w="19050">
+            <a:solidFill>
+              <a:srgbClr val="FF0066"/>
+            </a:solidFill>
+            <a:prstDash val="sysDash"/>
+            <a:tailEnd type="triangle"/>
+          </a:ln>
+        </p:spPr>
+        <p:style>
+          <a:lnRef idx="1">
+            <a:schemeClr val="accent1"/>
+          </a:lnRef>
+          <a:fillRef idx="0">
+            <a:schemeClr val="accent1"/>
+          </a:fillRef>
+          <a:effectRef idx="0">
+            <a:schemeClr val="accent1"/>
+          </a:effectRef>
+          <a:fontRef idx="minor">
+            <a:schemeClr val="tx1"/>
+          </a:fontRef>
+        </p:style>
+      </p:cxnSp>
+      <p:cxnSp>
+        <p:nvCxnSpPr>
+          <p:cNvPr id="88" name="직선 화살표 연결선 87">
+            <a:extLst>
+              <a:ext uri="{FF2B5EF4-FFF2-40B4-BE49-F238E27FC236}">
+                <a16:creationId xmlns:a16="http://schemas.microsoft.com/office/drawing/2014/main" id="{D1FB8551-C9BD-9AA4-9325-217BEC678BD7}"/>
+              </a:ext>
+            </a:extLst>
+          </p:cNvPr>
+          <p:cNvCxnSpPr/>
+          <p:nvPr/>
+        </p:nvCxnSpPr>
+        <p:spPr>
+          <a:xfrm>
+            <a:off x="1153251" y="2582411"/>
+            <a:ext cx="2961612" cy="0"/>
+          </a:xfrm>
+          <a:prstGeom prst="straightConnector1">
+            <a:avLst/>
+          </a:prstGeom>
+          <a:ln w="19050">
+            <a:solidFill>
+              <a:srgbClr val="FF0066"/>
+            </a:solidFill>
+            <a:prstDash val="sysDash"/>
+            <a:tailEnd type="triangle"/>
+          </a:ln>
+        </p:spPr>
+        <p:style>
+          <a:lnRef idx="1">
+            <a:schemeClr val="accent1"/>
+          </a:lnRef>
+          <a:fillRef idx="0">
+            <a:schemeClr val="accent1"/>
+          </a:fillRef>
+          <a:effectRef idx="0">
+            <a:schemeClr val="accent1"/>
+          </a:effectRef>
+          <a:fontRef idx="minor">
+            <a:schemeClr val="tx1"/>
+          </a:fontRef>
+        </p:style>
+      </p:cxnSp>
+      <p:sp>
+        <p:nvSpPr>
+          <p:cNvPr id="56" name="label">
+            <a:extLst>
+              <a:ext uri="{FF2B5EF4-FFF2-40B4-BE49-F238E27FC236}">
+                <a16:creationId xmlns:a16="http://schemas.microsoft.com/office/drawing/2014/main" id="{D90A29EC-0622-764A-D92D-F743C57A442B}"/>
+              </a:ext>
+            </a:extLst>
+          </p:cNvPr>
+          <p:cNvSpPr txBox="1">
+            <a:spLocks noChangeArrowheads="1"/>
+          </p:cNvSpPr>
+          <p:nvPr/>
+        </p:nvSpPr>
+        <p:spPr>
+          <a:xfrm>
+            <a:off x="1754470" y="2442673"/>
+            <a:ext cx="966858" cy="246221"/>
+          </a:xfrm>
+          <a:prstGeom prst="rect">
+            <a:avLst/>
+          </a:prstGeom>
+          <a:solidFill>
+            <a:schemeClr val="bg1"/>
+          </a:solidFill>
+          <a:ln>
+            <a:noFill/>
+          </a:ln>
+        </p:spPr>
+        <p:style>
+          <a:lnRef idx="2">
+            <a:schemeClr val="dk1">
+              <a:shade val="15000"/>
+            </a:schemeClr>
+          </a:lnRef>
+          <a:fillRef idx="1">
+            <a:schemeClr val="dk1"/>
+          </a:fillRef>
+          <a:effectRef idx="0">
+            <a:schemeClr val="dk1"/>
+          </a:effectRef>
+          <a:fontRef idx="minor">
+            <a:schemeClr val="lt1"/>
+          </a:fontRef>
+        </p:style>
+        <p:txBody>
+          <a:bodyPr wrap="square">
+            <a:spAutoFit/>
+          </a:bodyPr>
+          <a:lstStyle>
+            <a:lvl1pPr marL="0" indent="0">
+              <a:lnSpc>
+                <a:spcPct val="100000"/>
+              </a:lnSpc>
+              <a:spcBef>
+                <a:spcPct val="0"/>
+              </a:spcBef>
+              <a:spcAft>
+                <a:spcPts val="0"/>
+              </a:spcAft>
+              <a:defRPr kumimoji="0" sz="1800" b="0" i="0" u="none" strike="noStrike" kern="0" cap="none" spc="0" normalizeH="0" baseline="0">
+                <a:solidFill>
+                  <a:schemeClr val="tx1"/>
+                </a:solidFill>
+              </a:defRPr>
+            </a:lvl1pPr>
+          </a:lstStyle>
+          <a:p>
+            <a:pPr algn="ctr" eaLnBrk="1" hangingPunct="1">
+              <a:defRPr/>
+            </a:pPr>
+            <a:r>
+              <a:rPr lang="en-US" altLang="en-US" sz="1000" i="1" dirty="0">
+                <a:latin typeface="Arial"/>
+                <a:cs typeface="Arial"/>
+              </a:rPr>
+              <a:t>Upload Video</a:t>
+            </a:r>
+          </a:p>
+        </p:txBody>
+      </p:sp>
+      <p:sp>
+        <p:nvSpPr>
+          <p:cNvPr id="89" name="label">
+            <a:extLst>
+              <a:ext uri="{FF2B5EF4-FFF2-40B4-BE49-F238E27FC236}">
+                <a16:creationId xmlns:a16="http://schemas.microsoft.com/office/drawing/2014/main" id="{8858637E-80DB-A9BA-1ABA-E4008C3D5D92}"/>
+              </a:ext>
+            </a:extLst>
+          </p:cNvPr>
+          <p:cNvSpPr txBox="1">
+            <a:spLocks noChangeArrowheads="1"/>
+          </p:cNvSpPr>
+          <p:nvPr/>
+        </p:nvSpPr>
+        <p:spPr>
+          <a:xfrm>
+            <a:off x="1673166" y="2722392"/>
+            <a:ext cx="1122905" cy="246221"/>
+          </a:xfrm>
+          <a:prstGeom prst="rect">
+            <a:avLst/>
+          </a:prstGeom>
+          <a:solidFill>
+            <a:schemeClr val="bg1"/>
+          </a:solidFill>
+          <a:ln>
+            <a:noFill/>
+          </a:ln>
+        </p:spPr>
+        <p:style>
+          <a:lnRef idx="2">
+            <a:schemeClr val="dk1">
+              <a:shade val="15000"/>
+            </a:schemeClr>
+          </a:lnRef>
+          <a:fillRef idx="1">
+            <a:schemeClr val="dk1"/>
+          </a:fillRef>
+          <a:effectRef idx="0">
+            <a:schemeClr val="dk1"/>
+          </a:effectRef>
+          <a:fontRef idx="minor">
+            <a:schemeClr val="lt1"/>
+          </a:fontRef>
+        </p:style>
+        <p:txBody>
+          <a:bodyPr wrap="square">
+            <a:spAutoFit/>
+          </a:bodyPr>
+          <a:lstStyle>
+            <a:lvl1pPr marL="0" indent="0">
+              <a:lnSpc>
+                <a:spcPct val="100000"/>
+              </a:lnSpc>
+              <a:spcBef>
+                <a:spcPct val="0"/>
+              </a:spcBef>
+              <a:spcAft>
+                <a:spcPts val="0"/>
+              </a:spcAft>
+              <a:defRPr kumimoji="0" sz="1800" b="0" i="0" u="none" strike="noStrike" kern="0" cap="none" spc="0" normalizeH="0" baseline="0">
+                <a:solidFill>
+                  <a:schemeClr val="tx1"/>
+                </a:solidFill>
+              </a:defRPr>
+            </a:lvl1pPr>
+          </a:lstStyle>
+          <a:p>
+            <a:pPr algn="ctr" eaLnBrk="1" hangingPunct="1">
+              <a:defRPr/>
+            </a:pPr>
+            <a:r>
+              <a:rPr lang="en-US" altLang="en-US" sz="1000" i="1" dirty="0">
+                <a:latin typeface="Arial"/>
+                <a:cs typeface="Arial"/>
+              </a:rPr>
+              <a:t>Analyzed Graph</a:t>
+            </a:r>
+          </a:p>
+        </p:txBody>
+      </p:sp>
+      <p:sp>
+        <p:nvSpPr>
+          <p:cNvPr id="90" name="TextBox 89">
+            <a:extLst>
+              <a:ext uri="{FF2B5EF4-FFF2-40B4-BE49-F238E27FC236}">
+                <a16:creationId xmlns:a16="http://schemas.microsoft.com/office/drawing/2014/main" id="{E0FA139F-CA25-6503-24BD-94738A1A3599}"/>
+              </a:ext>
+            </a:extLst>
+          </p:cNvPr>
+          <p:cNvSpPr txBox="1"/>
+          <p:nvPr/>
+        </p:nvSpPr>
+        <p:spPr>
+          <a:xfrm>
+            <a:off x="1877115" y="2969599"/>
+            <a:ext cx="705642" cy="276999"/>
+          </a:xfrm>
+          <a:prstGeom prst="rect">
+            <a:avLst/>
+          </a:prstGeom>
+          <a:solidFill>
+            <a:srgbClr val="FF0066"/>
+          </a:solidFill>
+        </p:spPr>
+        <p:style>
+          <a:lnRef idx="2">
+            <a:schemeClr val="accent4">
+              <a:shade val="15000"/>
+            </a:schemeClr>
+          </a:lnRef>
+          <a:fillRef idx="1">
+            <a:schemeClr val="accent4"/>
+          </a:fillRef>
+          <a:effectRef idx="0">
+            <a:schemeClr val="accent4"/>
+          </a:effectRef>
+          <a:fontRef idx="minor">
+            <a:schemeClr val="lt1"/>
+          </a:fontRef>
+        </p:style>
+        <p:txBody>
+          <a:bodyPr wrap="none" rtlCol="0">
+            <a:spAutoFit/>
+          </a:bodyPr>
+          <a:lstStyle/>
+          <a:p>
+            <a:r>
+              <a:rPr lang="en-US" altLang="ko-KR" sz="1200" b="1" dirty="0">
+                <a:solidFill>
+                  <a:schemeClr val="bg1"/>
+                </a:solidFill>
+              </a:rPr>
+              <a:t>Output</a:t>
+            </a:r>
+            <a:endParaRPr lang="ko-KR" altLang="en-US" sz="1200" b="1" dirty="0">
+              <a:solidFill>
+                <a:schemeClr val="bg1"/>
+              </a:solidFill>
+            </a:endParaRPr>
+          </a:p>
+        </p:txBody>
+      </p:sp>
+      <p:sp>
+        <p:nvSpPr>
+          <p:cNvPr id="149" name="label">
+            <a:extLst>
+              <a:ext uri="{FF2B5EF4-FFF2-40B4-BE49-F238E27FC236}">
+                <a16:creationId xmlns:a16="http://schemas.microsoft.com/office/drawing/2014/main" id="{BF579B65-B8C7-5FD6-E7FC-FC30C7F55870}"/>
+              </a:ext>
+            </a:extLst>
+          </p:cNvPr>
+          <p:cNvSpPr txBox="1">
+            <a:spLocks noChangeArrowheads="1"/>
+          </p:cNvSpPr>
+          <p:nvPr/>
+        </p:nvSpPr>
+        <p:spPr>
+          <a:xfrm>
+            <a:off x="5795123" y="4329983"/>
+            <a:ext cx="612000" cy="246221"/>
+          </a:xfrm>
+          <a:prstGeom prst="rect">
+            <a:avLst/>
+          </a:prstGeom>
+          <a:solidFill>
+            <a:schemeClr val="bg1"/>
+          </a:solidFill>
+          <a:ln>
+            <a:solidFill>
+              <a:schemeClr val="bg1"/>
+            </a:solidFill>
+          </a:ln>
+        </p:spPr>
+        <p:style>
+          <a:lnRef idx="2">
+            <a:schemeClr val="dk1"/>
+          </a:lnRef>
+          <a:fillRef idx="1">
+            <a:schemeClr val="lt1"/>
+          </a:fillRef>
+          <a:effectRef idx="0">
+            <a:schemeClr val="dk1"/>
+          </a:effectRef>
+          <a:fontRef idx="minor">
+            <a:schemeClr val="dk1"/>
+          </a:fontRef>
+        </p:style>
+        <p:txBody>
+          <a:bodyPr wrap="square">
+            <a:spAutoFit/>
+          </a:bodyPr>
+          <a:lstStyle>
+            <a:lvl1pPr marL="0" indent="0">
+              <a:lnSpc>
+                <a:spcPct val="100000"/>
+              </a:lnSpc>
+              <a:spcBef>
+                <a:spcPct val="0"/>
+              </a:spcBef>
+              <a:spcAft>
+                <a:spcPts val="0"/>
+              </a:spcAft>
+              <a:defRPr kumimoji="0" sz="1800" b="0" i="0" u="none" strike="noStrike" kern="0" cap="none" spc="0" normalizeH="0" baseline="0">
+                <a:solidFill>
+                  <a:schemeClr val="tx1"/>
+                </a:solidFill>
+              </a:defRPr>
+            </a:lvl1pPr>
+          </a:lstStyle>
+          <a:p>
+            <a:pPr algn="ctr" eaLnBrk="1" hangingPunct="1">
+              <a:defRPr/>
+            </a:pPr>
+            <a:r>
+              <a:rPr lang="en-US" altLang="en-US" sz="1000" i="1" dirty="0">
+                <a:latin typeface="Arial"/>
+                <a:cs typeface="Arial"/>
+              </a:rPr>
+              <a:t>Trigger</a:t>
+            </a:r>
+          </a:p>
+        </p:txBody>
+      </p:sp>
+      <p:sp>
+        <p:nvSpPr>
+          <p:cNvPr id="109" name="TextBox 108">
+            <a:extLst>
+              <a:ext uri="{FF2B5EF4-FFF2-40B4-BE49-F238E27FC236}">
+                <a16:creationId xmlns:a16="http://schemas.microsoft.com/office/drawing/2014/main" id="{A65F1836-25F1-4E00-EE20-BC6DAE6E2ED7}"/>
+              </a:ext>
+            </a:extLst>
+          </p:cNvPr>
+          <p:cNvSpPr txBox="1"/>
+          <p:nvPr/>
+        </p:nvSpPr>
+        <p:spPr>
+          <a:xfrm>
+            <a:off x="5089492" y="2444419"/>
+            <a:ext cx="409086" cy="323165"/>
+          </a:xfrm>
+          <a:prstGeom prst="rect">
+            <a:avLst/>
+          </a:prstGeom>
+          <a:noFill/>
+        </p:spPr>
+        <p:txBody>
+          <a:bodyPr wrap="none" rtlCol="0">
+            <a:spAutoFit/>
+          </a:bodyPr>
+          <a:lstStyle/>
+          <a:p>
+            <a:r>
+              <a:rPr lang="en-US" altLang="ko-KR" sz="1500" b="1" dirty="0">
+                <a:solidFill>
+                  <a:srgbClr val="ED7100"/>
+                </a:solidFill>
+              </a:rPr>
+              <a:t>T2</a:t>
+            </a:r>
+            <a:endParaRPr lang="ko-KR" altLang="en-US" sz="1500" b="1" dirty="0">
+              <a:solidFill>
+                <a:srgbClr val="ED7100"/>
+              </a:solidFill>
+            </a:endParaRPr>
+          </a:p>
+        </p:txBody>
+      </p:sp>
+      <p:sp>
+        <p:nvSpPr>
+          <p:cNvPr id="117" name="label">
+            <a:extLst>
+              <a:ext uri="{FF2B5EF4-FFF2-40B4-BE49-F238E27FC236}">
+                <a16:creationId xmlns:a16="http://schemas.microsoft.com/office/drawing/2014/main" id="{B6C5C9AE-ACB7-9719-1663-2CD3F698156A}"/>
+              </a:ext>
+            </a:extLst>
+          </p:cNvPr>
+          <p:cNvSpPr txBox="1">
+            <a:spLocks noChangeArrowheads="1"/>
+          </p:cNvSpPr>
+          <p:nvPr/>
+        </p:nvSpPr>
+        <p:spPr>
+          <a:xfrm>
+            <a:off x="10732265" y="4374731"/>
+            <a:ext cx="833838" cy="553998"/>
+          </a:xfrm>
+          <a:prstGeom prst="rect">
+            <a:avLst/>
+          </a:prstGeom>
+          <a:solidFill>
+            <a:schemeClr val="bg1"/>
+          </a:solidFill>
+          <a:ln>
+            <a:solidFill>
+              <a:schemeClr val="bg1"/>
+            </a:solidFill>
+          </a:ln>
+        </p:spPr>
+        <p:style>
+          <a:lnRef idx="2">
+            <a:schemeClr val="dk1"/>
+          </a:lnRef>
+          <a:fillRef idx="1">
+            <a:schemeClr val="lt1"/>
+          </a:fillRef>
+          <a:effectRef idx="0">
+            <a:schemeClr val="dk1"/>
+          </a:effectRef>
+          <a:fontRef idx="minor">
+            <a:schemeClr val="dk1"/>
+          </a:fontRef>
+        </p:style>
+        <p:txBody>
+          <a:bodyPr wrap="square">
+            <a:spAutoFit/>
+          </a:bodyPr>
+          <a:lstStyle>
+            <a:lvl1pPr marL="0" indent="0">
+              <a:lnSpc>
+                <a:spcPct val="100000"/>
+              </a:lnSpc>
+              <a:spcBef>
+                <a:spcPct val="0"/>
+              </a:spcBef>
+              <a:spcAft>
+                <a:spcPts val="0"/>
+              </a:spcAft>
+              <a:defRPr kumimoji="0" sz="1800" b="0" i="0" u="none" strike="noStrike" kern="0" cap="none" spc="0" normalizeH="0" baseline="0">
+                <a:solidFill>
+                  <a:schemeClr val="tx1"/>
+                </a:solidFill>
+              </a:defRPr>
+            </a:lvl1pPr>
+          </a:lstStyle>
+          <a:p>
+            <a:pPr algn="ctr" eaLnBrk="1" hangingPunct="1">
+              <a:defRPr/>
+            </a:pPr>
+            <a:r>
+              <a:rPr lang="en-US" altLang="en-US" sz="1000" i="1" dirty="0">
+                <a:latin typeface="Arial"/>
+                <a:cs typeface="Arial"/>
+              </a:rPr>
+              <a:t>Load </a:t>
+            </a:r>
+            <a:br>
+              <a:rPr lang="en-US" altLang="en-US" sz="1000" i="1" dirty="0">
+                <a:latin typeface="Arial"/>
+                <a:cs typeface="Arial"/>
+              </a:rPr>
+            </a:br>
+            <a:r>
+              <a:rPr lang="en-US" altLang="en-US" sz="1000" i="1" dirty="0">
+                <a:latin typeface="Arial"/>
+                <a:cs typeface="Arial"/>
+              </a:rPr>
+              <a:t>Extracted</a:t>
+            </a:r>
+          </a:p>
+          <a:p>
+            <a:pPr algn="ctr" eaLnBrk="1" hangingPunct="1">
+              <a:defRPr/>
+            </a:pPr>
+            <a:r>
+              <a:rPr lang="en-US" altLang="en-US" sz="1000" i="1" dirty="0">
+                <a:latin typeface="Arial"/>
+                <a:cs typeface="Arial"/>
+              </a:rPr>
+              <a:t>Video Data</a:t>
+            </a:r>
+          </a:p>
+        </p:txBody>
+      </p:sp>
+      <p:cxnSp>
+        <p:nvCxnSpPr>
+          <p:cNvPr id="151" name="연결선: 꺾임 150">
+            <a:extLst>
+              <a:ext uri="{FF2B5EF4-FFF2-40B4-BE49-F238E27FC236}">
+                <a16:creationId xmlns:a16="http://schemas.microsoft.com/office/drawing/2014/main" id="{43CAC219-46CA-2C26-DAC8-0540B28596BF}"/>
+              </a:ext>
+            </a:extLst>
+          </p:cNvPr>
+          <p:cNvCxnSpPr>
+            <a:cxnSpLocks/>
+            <a:endCxn id="50" idx="1"/>
+          </p:cNvCxnSpPr>
+          <p:nvPr/>
+        </p:nvCxnSpPr>
+        <p:spPr>
+          <a:xfrm>
+            <a:off x="4256855" y="3244028"/>
+            <a:ext cx="4025451" cy="2674244"/>
+          </a:xfrm>
+          <a:prstGeom prst="bentConnector3">
+            <a:avLst>
+              <a:gd name="adj1" fmla="val 14"/>
+            </a:avLst>
+          </a:prstGeom>
+          <a:ln w="19050">
+            <a:solidFill>
+              <a:srgbClr val="C925D1"/>
+            </a:solidFill>
+            <a:headEnd type="triangle"/>
+            <a:tailEnd type="triangle"/>
+          </a:ln>
+        </p:spPr>
+        <p:style>
+          <a:lnRef idx="1">
+            <a:schemeClr val="accent1"/>
+          </a:lnRef>
+          <a:fillRef idx="0">
+            <a:schemeClr val="accent1"/>
+          </a:fillRef>
+          <a:effectRef idx="0">
+            <a:schemeClr val="accent1"/>
+          </a:effectRef>
+          <a:fontRef idx="minor">
+            <a:schemeClr val="tx1"/>
+          </a:fontRef>
+        </p:style>
+      </p:cxnSp>
+      <p:grpSp>
+        <p:nvGrpSpPr>
+          <p:cNvPr id="158" name="그룹 157">
+            <a:extLst>
+              <a:ext uri="{FF2B5EF4-FFF2-40B4-BE49-F238E27FC236}">
+                <a16:creationId xmlns:a16="http://schemas.microsoft.com/office/drawing/2014/main" id="{53446B3B-6EDA-5334-1E7F-D5450132B90C}"/>
+              </a:ext>
+            </a:extLst>
+          </p:cNvPr>
+          <p:cNvGrpSpPr/>
+          <p:nvPr/>
+        </p:nvGrpSpPr>
+        <p:grpSpPr>
+          <a:xfrm>
+            <a:off x="7489509" y="4097734"/>
+            <a:ext cx="2292350" cy="1005091"/>
+            <a:chOff x="427363" y="4361310"/>
+            <a:chExt cx="2292350" cy="1005091"/>
+          </a:xfrm>
+        </p:grpSpPr>
+        <p:pic>
+          <p:nvPicPr>
+            <p:cNvPr id="156" name="Graphic 26" descr="Amazon Simple Queue Service (Amazon SQS) service icon.">
+              <a:extLst>
+                <a:ext uri="{FF2B5EF4-FFF2-40B4-BE49-F238E27FC236}">
+                  <a16:creationId xmlns:a16="http://schemas.microsoft.com/office/drawing/2014/main" id="{1ACC4ED5-1827-77F0-DB57-F1BE1310D524}"/>
+                </a:ext>
+              </a:extLst>
+            </p:cNvPr>
+            <p:cNvPicPr>
+              <a:picLocks noChangeAspect="1" noChangeArrowheads="1"/>
+            </p:cNvPicPr>
+            <p:nvPr/>
+          </p:nvPicPr>
+          <p:blipFill>
+            <a:blip r:embed="rId23">
+              <a:extLst>
+                <a:ext uri="{96DAC541-7B7A-43D3-8B79-37D633B846F1}">
+                  <asvg:svgBlip xmlns:asvg="http://schemas.microsoft.com/office/drawing/2016/SVG/main" r:embed="rId24"/>
+                </a:ext>
+              </a:extLst>
+            </a:blip>
+            <a:srcRect/>
+            <a:stretch/>
+          </p:blipFill>
+          <p:spPr bwMode="auto">
+            <a:xfrm>
+              <a:off x="1205498" y="4361310"/>
+              <a:ext cx="705600" cy="705600"/>
+            </a:xfrm>
+            <a:prstGeom prst="rect">
+              <a:avLst/>
+            </a:prstGeom>
+            <a:noFill/>
+            <a:ln>
+              <a:noFill/>
+            </a:ln>
+            <a:extLst>
+              <a:ext uri="{909E8E84-426E-40DD-AFC4-6F175D3DCCD1}">
+                <a14:hiddenFill xmlns:a14="http://schemas.microsoft.com/office/drawing/2010/main">
+                  <a:solidFill>
+                    <a:srgbClr val="FFFFFF"/>
+                  </a:solidFill>
+                </a14:hiddenFill>
+              </a:ext>
+              <a:ext uri="{91240B29-F687-4F45-9708-019B960494DF}">
+                <a14:hiddenLine xmlns:a14="http://schemas.microsoft.com/office/drawing/2010/main" w="9525">
+                  <a:solidFill>
+                    <a:srgbClr val="000000"/>
+                  </a:solidFill>
+                  <a:miter lim="800000"/>
+                  <a:headEnd/>
+                  <a:tailEnd/>
+                </a14:hiddenLine>
+              </a:ext>
+            </a:extLst>
+          </p:spPr>
+        </p:pic>
+        <p:sp>
+          <p:nvSpPr>
+            <p:cNvPr id="157" name="TextBox 11">
+              <a:extLst>
+                <a:ext uri="{FF2B5EF4-FFF2-40B4-BE49-F238E27FC236}">
+                  <a16:creationId xmlns:a16="http://schemas.microsoft.com/office/drawing/2014/main" id="{4E64CFD3-DC0F-4258-C8AF-24695DC25553}"/>
+                </a:ext>
+              </a:extLst>
+            </p:cNvPr>
+            <p:cNvSpPr txBox="1">
+              <a:spLocks noChangeArrowheads="1"/>
+            </p:cNvSpPr>
+            <p:nvPr/>
+          </p:nvSpPr>
+          <p:spPr bwMode="auto">
+            <a:xfrm>
+              <a:off x="427363" y="5089402"/>
+              <a:ext cx="2292350" cy="276999"/>
+            </a:xfrm>
+            <a:prstGeom prst="rect">
+              <a:avLst/>
+            </a:prstGeom>
+            <a:noFill/>
+            <a:ln>
+              <a:noFill/>
+            </a:ln>
+            <a:extLst>
+              <a:ext uri="{909E8E84-426E-40DD-AFC4-6F175D3DCCD1}">
+                <a14:hiddenFill xmlns:a14="http://schemas.microsoft.com/office/drawing/2010/main">
+                  <a:solidFill>
+                    <a:srgbClr val="FFFFFF"/>
+                  </a:solidFill>
+                </a14:hiddenFill>
+              </a:ext>
+              <a:ext uri="{91240B29-F687-4F45-9708-019B960494DF}">
+                <a14:hiddenLine xmlns:a14="http://schemas.microsoft.com/office/drawing/2010/main" w="9525">
+                  <a:solidFill>
+                    <a:srgbClr val="000000"/>
+                  </a:solidFill>
+                  <a:miter lim="800000"/>
+                  <a:headEnd/>
+                  <a:tailEnd/>
+                </a14:hiddenLine>
+              </a:ext>
+            </a:extLst>
+          </p:spPr>
+          <p:txBody>
+            <a:bodyPr>
+              <a:spAutoFit/>
+            </a:bodyPr>
+            <a:lstStyle>
+              <a:lvl1pPr>
+                <a:defRPr>
+                  <a:solidFill>
+                    <a:schemeClr val="tx1"/>
+                  </a:solidFill>
+                  <a:latin typeface="Calibri" panose="020F0502020204030204" pitchFamily="34" charset="0"/>
+                </a:defRPr>
+              </a:lvl1pPr>
+              <a:lvl2pPr marL="742950" indent="-285750">
+                <a:defRPr>
+                  <a:solidFill>
+                    <a:schemeClr val="tx1"/>
+                  </a:solidFill>
+                  <a:latin typeface="Calibri" panose="020F0502020204030204" pitchFamily="34" charset="0"/>
+                </a:defRPr>
+              </a:lvl2pPr>
+              <a:lvl3pPr marL="1143000" indent="-228600">
+                <a:defRPr>
+                  <a:solidFill>
+                    <a:schemeClr val="tx1"/>
+                  </a:solidFill>
+                  <a:latin typeface="Calibri" panose="020F0502020204030204" pitchFamily="34" charset="0"/>
+                </a:defRPr>
+              </a:lvl3pPr>
+              <a:lvl4pPr marL="1600200" indent="-228600">
+                <a:defRPr>
+                  <a:solidFill>
+                    <a:schemeClr val="tx1"/>
+                  </a:solidFill>
+                  <a:latin typeface="Calibri" panose="020F0502020204030204" pitchFamily="34" charset="0"/>
+                </a:defRPr>
+              </a:lvl4pPr>
+              <a:lvl5pPr marL="2057400" indent="-228600">
+                <a:defRPr>
+                  <a:solidFill>
+                    <a:schemeClr val="tx1"/>
+                  </a:solidFill>
+                  <a:latin typeface="Calibri" panose="020F0502020204030204" pitchFamily="34" charset="0"/>
+                </a:defRPr>
+              </a:lvl5pPr>
+              <a:lvl6pPr marL="2514600" indent="-228600" eaLnBrk="0" fontAlgn="base" hangingPunct="0">
+                <a:spcBef>
+                  <a:spcPct val="0"/>
+                </a:spcBef>
+                <a:spcAft>
+                  <a:spcPct val="0"/>
+                </a:spcAft>
+                <a:defRPr>
+                  <a:solidFill>
+                    <a:schemeClr val="tx1"/>
+                  </a:solidFill>
+                  <a:latin typeface="Calibri" panose="020F0502020204030204" pitchFamily="34" charset="0"/>
+                </a:defRPr>
+              </a:lvl6pPr>
+              <a:lvl7pPr marL="2971800" indent="-228600" eaLnBrk="0" fontAlgn="base" hangingPunct="0">
+                <a:spcBef>
+                  <a:spcPct val="0"/>
+                </a:spcBef>
+                <a:spcAft>
+                  <a:spcPct val="0"/>
+                </a:spcAft>
+                <a:defRPr>
+                  <a:solidFill>
+                    <a:schemeClr val="tx1"/>
+                  </a:solidFill>
+                  <a:latin typeface="Calibri" panose="020F0502020204030204" pitchFamily="34" charset="0"/>
+                </a:defRPr>
+              </a:lvl7pPr>
+              <a:lvl8pPr marL="3429000" indent="-228600" eaLnBrk="0" fontAlgn="base" hangingPunct="0">
+                <a:spcBef>
+                  <a:spcPct val="0"/>
+                </a:spcBef>
+                <a:spcAft>
+                  <a:spcPct val="0"/>
+                </a:spcAft>
+                <a:defRPr>
+                  <a:solidFill>
+                    <a:schemeClr val="tx1"/>
+                  </a:solidFill>
+                  <a:latin typeface="Calibri" panose="020F0502020204030204" pitchFamily="34" charset="0"/>
+                </a:defRPr>
+              </a:lvl8pPr>
+              <a:lvl9pPr marL="3886200" indent="-228600" eaLnBrk="0" fontAlgn="base" hangingPunct="0">
+                <a:spcBef>
+                  <a:spcPct val="0"/>
+                </a:spcBef>
+                <a:spcAft>
+                  <a:spcPct val="0"/>
+                </a:spcAft>
+                <a:defRPr>
+                  <a:solidFill>
+                    <a:schemeClr val="tx1"/>
+                  </a:solidFill>
+                  <a:latin typeface="Calibri" panose="020F0502020204030204" pitchFamily="34" charset="0"/>
+                </a:defRPr>
+              </a:lvl9pPr>
+            </a:lstStyle>
+            <a:p>
+              <a:pPr algn="ctr" eaLnBrk="1" hangingPunct="1"/>
+              <a:r>
+                <a:rPr lang="en-US" altLang="en-US" sz="1200" dirty="0">
+                  <a:latin typeface="Arial" panose="020B0604020202020204" pitchFamily="34" charset="0"/>
+                  <a:ea typeface="Amazon Ember" panose="020B0603020204020204" pitchFamily="34" charset="0"/>
+                  <a:cs typeface="Arial" panose="020B0604020202020204" pitchFamily="34" charset="0"/>
+                </a:rPr>
+                <a:t>Amazon SQS</a:t>
+              </a:r>
+            </a:p>
+          </p:txBody>
+        </p:sp>
+      </p:grpSp>
+      <p:sp>
+        <p:nvSpPr>
+          <p:cNvPr id="169" name="TextBox 168">
+            <a:extLst>
+              <a:ext uri="{FF2B5EF4-FFF2-40B4-BE49-F238E27FC236}">
+                <a16:creationId xmlns:a16="http://schemas.microsoft.com/office/drawing/2014/main" id="{69FBF9EB-9BCE-2ACB-79E0-BBDE52B626B6}"/>
+              </a:ext>
+            </a:extLst>
+          </p:cNvPr>
+          <p:cNvSpPr txBox="1"/>
+          <p:nvPr/>
+        </p:nvSpPr>
+        <p:spPr>
+          <a:xfrm>
+            <a:off x="1942838" y="2167671"/>
+            <a:ext cx="574196" cy="276999"/>
+          </a:xfrm>
+          <a:prstGeom prst="rect">
+            <a:avLst/>
+          </a:prstGeom>
+          <a:solidFill>
+            <a:srgbClr val="FF0066"/>
+          </a:solidFill>
+        </p:spPr>
+        <p:style>
+          <a:lnRef idx="2">
+            <a:schemeClr val="accent4">
+              <a:shade val="15000"/>
+            </a:schemeClr>
+          </a:lnRef>
+          <a:fillRef idx="1">
+            <a:schemeClr val="accent4"/>
+          </a:fillRef>
+          <a:effectRef idx="0">
+            <a:schemeClr val="accent4"/>
+          </a:effectRef>
+          <a:fontRef idx="minor">
+            <a:schemeClr val="lt1"/>
+          </a:fontRef>
+        </p:style>
+        <p:txBody>
+          <a:bodyPr wrap="none" rtlCol="0">
+            <a:spAutoFit/>
+          </a:bodyPr>
+          <a:lstStyle/>
+          <a:p>
+            <a:r>
+              <a:rPr lang="en-US" altLang="ko-KR" sz="1200" b="1" dirty="0">
+                <a:solidFill>
+                  <a:schemeClr val="bg1"/>
+                </a:solidFill>
+              </a:rPr>
+              <a:t>Input</a:t>
+            </a:r>
+            <a:endParaRPr lang="ko-KR" altLang="en-US" sz="1200" b="1" dirty="0">
+              <a:solidFill>
+                <a:schemeClr val="bg1"/>
+              </a:solidFill>
+            </a:endParaRPr>
+          </a:p>
+        </p:txBody>
+      </p:sp>
+      <p:sp>
+        <p:nvSpPr>
+          <p:cNvPr id="122" name="label">
+            <a:extLst>
+              <a:ext uri="{FF2B5EF4-FFF2-40B4-BE49-F238E27FC236}">
+                <a16:creationId xmlns:a16="http://schemas.microsoft.com/office/drawing/2014/main" id="{7B59D974-55EF-F737-5B86-15ED3C881EF9}"/>
+              </a:ext>
+            </a:extLst>
+          </p:cNvPr>
+          <p:cNvSpPr txBox="1">
+            <a:spLocks noChangeArrowheads="1"/>
+          </p:cNvSpPr>
+          <p:nvPr/>
+        </p:nvSpPr>
+        <p:spPr>
+          <a:xfrm>
+            <a:off x="3560483" y="5300015"/>
+            <a:ext cx="1407862" cy="400110"/>
+          </a:xfrm>
+          <a:prstGeom prst="rect">
+            <a:avLst/>
+          </a:prstGeom>
+          <a:solidFill>
+            <a:schemeClr val="bg1"/>
+          </a:solidFill>
+          <a:ln>
+            <a:solidFill>
+              <a:schemeClr val="bg1"/>
+            </a:solidFill>
+          </a:ln>
+        </p:spPr>
+        <p:style>
+          <a:lnRef idx="2">
+            <a:schemeClr val="dk1"/>
+          </a:lnRef>
+          <a:fillRef idx="1">
+            <a:schemeClr val="lt1"/>
+          </a:fillRef>
+          <a:effectRef idx="0">
+            <a:schemeClr val="dk1"/>
+          </a:effectRef>
+          <a:fontRef idx="minor">
+            <a:schemeClr val="dk1"/>
+          </a:fontRef>
+        </p:style>
+        <p:txBody>
+          <a:bodyPr wrap="square">
+            <a:spAutoFit/>
+          </a:bodyPr>
+          <a:lstStyle>
+            <a:lvl1pPr marL="0" indent="0">
+              <a:lnSpc>
+                <a:spcPct val="100000"/>
+              </a:lnSpc>
+              <a:spcBef>
+                <a:spcPct val="0"/>
+              </a:spcBef>
+              <a:spcAft>
+                <a:spcPts val="0"/>
+              </a:spcAft>
+              <a:defRPr kumimoji="0" sz="1800" b="0" i="0" u="none" strike="noStrike" kern="0" cap="none" spc="0" normalizeH="0" baseline="0">
+                <a:solidFill>
+                  <a:schemeClr val="tx1"/>
+                </a:solidFill>
+              </a:defRPr>
+            </a:lvl1pPr>
+          </a:lstStyle>
+          <a:p>
+            <a:pPr algn="ctr" eaLnBrk="1" hangingPunct="1">
+              <a:defRPr/>
+            </a:pPr>
+            <a:r>
+              <a:rPr lang="en-US" altLang="en-US" sz="1000" i="1" dirty="0">
+                <a:latin typeface="Arial"/>
+                <a:cs typeface="Arial"/>
+              </a:rPr>
+              <a:t>Request &amp; Response</a:t>
+            </a:r>
+          </a:p>
+          <a:p>
+            <a:pPr algn="ctr" eaLnBrk="1" hangingPunct="1">
+              <a:defRPr/>
+            </a:pPr>
+            <a:r>
+              <a:rPr lang="en-US" altLang="en-US" sz="1000" i="1" dirty="0">
+                <a:latin typeface="Arial"/>
+                <a:cs typeface="Arial"/>
+              </a:rPr>
+              <a:t>Analyzed Data</a:t>
+            </a:r>
+          </a:p>
+        </p:txBody>
+      </p:sp>
+      <p:cxnSp>
+        <p:nvCxnSpPr>
+          <p:cNvPr id="182" name="연결선: 꺾임 181">
+            <a:extLst>
+              <a:ext uri="{FF2B5EF4-FFF2-40B4-BE49-F238E27FC236}">
+                <a16:creationId xmlns:a16="http://schemas.microsoft.com/office/drawing/2014/main" id="{637B0F44-D2C3-A8C1-DD24-77D6EB945193}"/>
+              </a:ext>
+            </a:extLst>
+          </p:cNvPr>
+          <p:cNvCxnSpPr>
+            <a:stCxn id="4" idx="0"/>
+            <a:endCxn id="156" idx="0"/>
+          </p:cNvCxnSpPr>
+          <p:nvPr/>
+        </p:nvCxnSpPr>
+        <p:spPr>
+          <a:xfrm rot="16200000" flipH="1">
+            <a:off x="7792174" y="3269465"/>
+            <a:ext cx="1113" cy="1655425"/>
+          </a:xfrm>
+          <a:prstGeom prst="bentConnector3">
+            <a:avLst>
+              <a:gd name="adj1" fmla="val -74168913"/>
+            </a:avLst>
+          </a:prstGeom>
+          <a:ln w="19050">
+            <a:solidFill>
+              <a:srgbClr val="ED7100"/>
+            </a:solidFill>
+            <a:tailEnd type="triangle"/>
+          </a:ln>
+        </p:spPr>
+        <p:style>
+          <a:lnRef idx="1">
+            <a:schemeClr val="accent1"/>
+          </a:lnRef>
+          <a:fillRef idx="0">
+            <a:schemeClr val="accent1"/>
+          </a:fillRef>
+          <a:effectRef idx="0">
+            <a:schemeClr val="accent1"/>
+          </a:effectRef>
+          <a:fontRef idx="minor">
+            <a:schemeClr val="tx1"/>
+          </a:fontRef>
+        </p:style>
+      </p:cxnSp>
+      <p:sp>
+        <p:nvSpPr>
+          <p:cNvPr id="147" name="label">
+            <a:extLst>
+              <a:ext uri="{FF2B5EF4-FFF2-40B4-BE49-F238E27FC236}">
+                <a16:creationId xmlns:a16="http://schemas.microsoft.com/office/drawing/2014/main" id="{A75C122B-1989-EA8E-E17C-D79108A6BF4D}"/>
+              </a:ext>
+            </a:extLst>
+          </p:cNvPr>
+          <p:cNvSpPr txBox="1">
+            <a:spLocks noChangeArrowheads="1"/>
+          </p:cNvSpPr>
+          <p:nvPr/>
+        </p:nvSpPr>
+        <p:spPr>
+          <a:xfrm>
+            <a:off x="7185044" y="3148949"/>
+            <a:ext cx="1217686" cy="246221"/>
+          </a:xfrm>
+          <a:prstGeom prst="rect">
+            <a:avLst/>
+          </a:prstGeom>
+          <a:solidFill>
+            <a:srgbClr val="E2F0D9"/>
+          </a:solidFill>
+          <a:ln>
+            <a:noFill/>
+          </a:ln>
+        </p:spPr>
+        <p:style>
+          <a:lnRef idx="2">
+            <a:schemeClr val="dk1"/>
+          </a:lnRef>
+          <a:fillRef idx="1">
+            <a:schemeClr val="lt1"/>
+          </a:fillRef>
+          <a:effectRef idx="0">
+            <a:schemeClr val="dk1"/>
+          </a:effectRef>
+          <a:fontRef idx="minor">
+            <a:schemeClr val="dk1"/>
+          </a:fontRef>
+        </p:style>
+        <p:txBody>
+          <a:bodyPr wrap="square">
+            <a:spAutoFit/>
+          </a:bodyPr>
+          <a:lstStyle>
+            <a:lvl1pPr marL="0" indent="0">
+              <a:lnSpc>
+                <a:spcPct val="100000"/>
+              </a:lnSpc>
+              <a:spcBef>
+                <a:spcPct val="0"/>
+              </a:spcBef>
+              <a:spcAft>
+                <a:spcPts val="0"/>
+              </a:spcAft>
+              <a:defRPr kumimoji="0" sz="1800" b="0" i="0" u="none" strike="noStrike" kern="0" cap="none" spc="0" normalizeH="0" baseline="0">
+                <a:solidFill>
+                  <a:schemeClr val="tx1"/>
+                </a:solidFill>
+              </a:defRPr>
+            </a:lvl1pPr>
+          </a:lstStyle>
+          <a:p>
+            <a:pPr algn="ctr" eaLnBrk="1" hangingPunct="1">
+              <a:defRPr/>
+            </a:pPr>
+            <a:r>
+              <a:rPr lang="en-US" altLang="en-US" sz="1000" i="1" dirty="0">
+                <a:latin typeface="Arial" panose="020B0604020202020204" pitchFamily="34" charset="0"/>
+                <a:ea typeface="Amazon Ember" panose="020B0603020204020204" pitchFamily="34" charset="0"/>
+                <a:cs typeface="Arial" panose="020B0604020202020204" pitchFamily="34" charset="0"/>
+              </a:rPr>
+              <a:t>Feature Extraction</a:t>
+            </a:r>
+            <a:endParaRPr lang="en-US" altLang="en-US" sz="1000" i="1" dirty="0">
+              <a:latin typeface="Arial"/>
+              <a:cs typeface="Arial"/>
+            </a:endParaRPr>
+          </a:p>
+        </p:txBody>
+      </p:sp>
+      <p:cxnSp>
+        <p:nvCxnSpPr>
+          <p:cNvPr id="197" name="직선 화살표 연결선 196">
+            <a:extLst>
+              <a:ext uri="{FF2B5EF4-FFF2-40B4-BE49-F238E27FC236}">
+                <a16:creationId xmlns:a16="http://schemas.microsoft.com/office/drawing/2014/main" id="{B6A0886C-EC24-6DDD-34E2-080FE3AC530E}"/>
+              </a:ext>
+            </a:extLst>
+          </p:cNvPr>
+          <p:cNvCxnSpPr>
+            <a:stCxn id="157" idx="2"/>
+            <a:endCxn id="50" idx="0"/>
+          </p:cNvCxnSpPr>
+          <p:nvPr/>
+        </p:nvCxnSpPr>
+        <p:spPr>
+          <a:xfrm flipH="1">
+            <a:off x="8635106" y="5102825"/>
+            <a:ext cx="578" cy="462647"/>
+          </a:xfrm>
+          <a:prstGeom prst="straightConnector1">
+            <a:avLst/>
+          </a:prstGeom>
+          <a:ln w="19050">
+            <a:solidFill>
+              <a:srgbClr val="E7157B"/>
+            </a:solidFill>
+            <a:tailEnd type="triangle"/>
+          </a:ln>
+        </p:spPr>
+        <p:style>
+          <a:lnRef idx="1">
+            <a:schemeClr val="accent1"/>
+          </a:lnRef>
+          <a:fillRef idx="0">
+            <a:schemeClr val="accent1"/>
+          </a:fillRef>
+          <a:effectRef idx="0">
+            <a:schemeClr val="accent1"/>
+          </a:effectRef>
+          <a:fontRef idx="minor">
+            <a:schemeClr val="tx1"/>
+          </a:fontRef>
+        </p:style>
+      </p:cxnSp>
+      <p:sp>
+        <p:nvSpPr>
+          <p:cNvPr id="195" name="label">
+            <a:extLst>
+              <a:ext uri="{FF2B5EF4-FFF2-40B4-BE49-F238E27FC236}">
+                <a16:creationId xmlns:a16="http://schemas.microsoft.com/office/drawing/2014/main" id="{95F3DC90-DB2D-1C2F-B907-3CB1CFCC2460}"/>
+              </a:ext>
+            </a:extLst>
+          </p:cNvPr>
+          <p:cNvSpPr txBox="1">
+            <a:spLocks noChangeArrowheads="1"/>
+          </p:cNvSpPr>
+          <p:nvPr/>
+        </p:nvSpPr>
+        <p:spPr>
+          <a:xfrm>
+            <a:off x="8272204" y="5209414"/>
+            <a:ext cx="701040" cy="168250"/>
+          </a:xfrm>
+          <a:prstGeom prst="rect">
+            <a:avLst/>
+          </a:prstGeom>
+          <a:solidFill>
+            <a:schemeClr val="bg1"/>
+          </a:solidFill>
+          <a:ln w="0">
+            <a:solidFill>
+              <a:schemeClr val="bg1"/>
+            </a:solidFill>
+          </a:ln>
+        </p:spPr>
+        <p:style>
+          <a:lnRef idx="2">
+            <a:schemeClr val="dk1"/>
+          </a:lnRef>
+          <a:fillRef idx="1">
+            <a:schemeClr val="lt1"/>
+          </a:fillRef>
+          <a:effectRef idx="0">
+            <a:schemeClr val="dk1"/>
+          </a:effectRef>
+          <a:fontRef idx="minor">
+            <a:schemeClr val="dk1"/>
+          </a:fontRef>
+        </p:style>
+        <p:txBody>
+          <a:bodyPr wrap="square" anchor="ctr">
+            <a:spAutoFit/>
+          </a:bodyPr>
+          <a:lstStyle>
+            <a:lvl1pPr marL="0" indent="0">
+              <a:lnSpc>
+                <a:spcPct val="100000"/>
+              </a:lnSpc>
+              <a:spcBef>
+                <a:spcPct val="0"/>
+              </a:spcBef>
+              <a:spcAft>
+                <a:spcPts val="0"/>
+              </a:spcAft>
+              <a:defRPr kumimoji="0" sz="1800" b="0" i="0" u="none" strike="noStrike" kern="0" cap="none" spc="0" normalizeH="0" baseline="0">
+                <a:solidFill>
+                  <a:schemeClr val="tx1"/>
+                </a:solidFill>
+              </a:defRPr>
+            </a:lvl1pPr>
+          </a:lstStyle>
+          <a:p>
+            <a:pPr algn="ctr" eaLnBrk="1" hangingPunct="1">
+              <a:defRPr/>
+            </a:pPr>
+            <a:r>
+              <a:rPr lang="en-US" altLang="en-US" sz="1000" i="1" dirty="0">
+                <a:latin typeface="Arial"/>
+                <a:cs typeface="Arial"/>
+              </a:rPr>
+              <a:t>Message</a:t>
+            </a:r>
+          </a:p>
+        </p:txBody>
+      </p:sp>
+      <p:sp>
+        <p:nvSpPr>
+          <p:cNvPr id="172" name="TextBox 171">
+            <a:extLst>
+              <a:ext uri="{FF2B5EF4-FFF2-40B4-BE49-F238E27FC236}">
+                <a16:creationId xmlns:a16="http://schemas.microsoft.com/office/drawing/2014/main" id="{72120E0D-E64C-6A28-3BEA-AAEFC17BDF64}"/>
+              </a:ext>
+            </a:extLst>
+          </p:cNvPr>
+          <p:cNvSpPr txBox="1"/>
+          <p:nvPr/>
+        </p:nvSpPr>
+        <p:spPr>
+          <a:xfrm>
+            <a:off x="5805536" y="4015152"/>
+            <a:ext cx="290464" cy="323165"/>
+          </a:xfrm>
+          <a:prstGeom prst="rect">
+            <a:avLst/>
+          </a:prstGeom>
+        </p:spPr>
+        <p:style>
+          <a:lnRef idx="2">
+            <a:schemeClr val="accent4">
+              <a:shade val="15000"/>
+            </a:schemeClr>
+          </a:lnRef>
+          <a:fillRef idx="1">
+            <a:schemeClr val="accent4"/>
+          </a:fillRef>
+          <a:effectRef idx="0">
+            <a:schemeClr val="accent4"/>
+          </a:effectRef>
+          <a:fontRef idx="minor">
+            <a:schemeClr val="lt1"/>
+          </a:fontRef>
+        </p:style>
+        <p:txBody>
+          <a:bodyPr wrap="none" rtlCol="0">
+            <a:spAutoFit/>
+          </a:bodyPr>
+          <a:lstStyle/>
+          <a:p>
+            <a:r>
+              <a:rPr lang="en-US" altLang="ko-KR" sz="1500" dirty="0">
+                <a:solidFill>
+                  <a:schemeClr val="tx1"/>
+                </a:solidFill>
+              </a:rPr>
+              <a:t>3</a:t>
+            </a:r>
+            <a:endParaRPr lang="ko-KR" altLang="en-US" sz="1500" dirty="0">
+              <a:solidFill>
+                <a:schemeClr val="tx1"/>
+              </a:solidFill>
+            </a:endParaRPr>
+          </a:p>
+        </p:txBody>
+      </p:sp>
+      <p:sp>
+        <p:nvSpPr>
+          <p:cNvPr id="201" name="TextBox 200">
+            <a:extLst>
+              <a:ext uri="{FF2B5EF4-FFF2-40B4-BE49-F238E27FC236}">
+                <a16:creationId xmlns:a16="http://schemas.microsoft.com/office/drawing/2014/main" id="{A20DC1B7-0367-A3FA-F950-CEBCBA7D91B7}"/>
+              </a:ext>
+            </a:extLst>
+          </p:cNvPr>
+          <p:cNvSpPr txBox="1"/>
+          <p:nvPr/>
+        </p:nvSpPr>
+        <p:spPr>
+          <a:xfrm>
+            <a:off x="6589004" y="3130230"/>
+            <a:ext cx="290464" cy="323165"/>
+          </a:xfrm>
+          <a:prstGeom prst="rect">
+            <a:avLst/>
+          </a:prstGeom>
+        </p:spPr>
+        <p:style>
+          <a:lnRef idx="2">
+            <a:schemeClr val="accent4">
+              <a:shade val="15000"/>
+            </a:schemeClr>
+          </a:lnRef>
+          <a:fillRef idx="1">
+            <a:schemeClr val="accent4"/>
+          </a:fillRef>
+          <a:effectRef idx="0">
+            <a:schemeClr val="accent4"/>
+          </a:effectRef>
+          <a:fontRef idx="minor">
+            <a:schemeClr val="lt1"/>
+          </a:fontRef>
+        </p:style>
+        <p:txBody>
+          <a:bodyPr wrap="none" rtlCol="0">
+            <a:spAutoFit/>
+          </a:bodyPr>
+          <a:lstStyle/>
+          <a:p>
+            <a:r>
+              <a:rPr lang="en-US" altLang="ko-KR" sz="1500" dirty="0">
+                <a:solidFill>
+                  <a:schemeClr val="tx1"/>
+                </a:solidFill>
+              </a:rPr>
+              <a:t>4</a:t>
+            </a:r>
+            <a:endParaRPr lang="ko-KR" altLang="en-US" sz="1500" dirty="0">
+              <a:solidFill>
+                <a:schemeClr val="tx1"/>
+              </a:solidFill>
+            </a:endParaRPr>
+          </a:p>
+        </p:txBody>
+      </p:sp>
+      <p:sp>
+        <p:nvSpPr>
+          <p:cNvPr id="202" name="TextBox 201">
+            <a:extLst>
+              <a:ext uri="{FF2B5EF4-FFF2-40B4-BE49-F238E27FC236}">
+                <a16:creationId xmlns:a16="http://schemas.microsoft.com/office/drawing/2014/main" id="{705D30D4-9488-0497-2DC0-711FB021937A}"/>
+              </a:ext>
+            </a:extLst>
+          </p:cNvPr>
+          <p:cNvSpPr txBox="1"/>
+          <p:nvPr/>
+        </p:nvSpPr>
+        <p:spPr>
+          <a:xfrm>
+            <a:off x="7967078" y="5138561"/>
+            <a:ext cx="290464" cy="323165"/>
+          </a:xfrm>
+          <a:prstGeom prst="rect">
+            <a:avLst/>
+          </a:prstGeom>
+        </p:spPr>
+        <p:style>
+          <a:lnRef idx="2">
+            <a:schemeClr val="accent4">
+              <a:shade val="15000"/>
+            </a:schemeClr>
+          </a:lnRef>
+          <a:fillRef idx="1">
+            <a:schemeClr val="accent4"/>
+          </a:fillRef>
+          <a:effectRef idx="0">
+            <a:schemeClr val="accent4"/>
+          </a:effectRef>
+          <a:fontRef idx="minor">
+            <a:schemeClr val="lt1"/>
+          </a:fontRef>
+        </p:style>
+        <p:txBody>
+          <a:bodyPr wrap="none" rtlCol="0">
+            <a:spAutoFit/>
+          </a:bodyPr>
+          <a:lstStyle/>
+          <a:p>
+            <a:r>
+              <a:rPr lang="en-US" altLang="ko-KR" sz="1500" dirty="0">
+                <a:solidFill>
+                  <a:schemeClr val="tx1"/>
+                </a:solidFill>
+              </a:rPr>
+              <a:t>5</a:t>
+            </a:r>
+            <a:endParaRPr lang="ko-KR" altLang="en-US" sz="1500" dirty="0">
+              <a:solidFill>
+                <a:schemeClr val="tx1"/>
+              </a:solidFill>
+            </a:endParaRPr>
+          </a:p>
+        </p:txBody>
+      </p:sp>
+      <p:sp>
+        <p:nvSpPr>
+          <p:cNvPr id="118" name="TextBox 117">
+            <a:extLst>
+              <a:ext uri="{FF2B5EF4-FFF2-40B4-BE49-F238E27FC236}">
+                <a16:creationId xmlns:a16="http://schemas.microsoft.com/office/drawing/2014/main" id="{E09E7382-15B9-1B4D-5370-1633A8949496}"/>
+              </a:ext>
+            </a:extLst>
+          </p:cNvPr>
+          <p:cNvSpPr txBox="1"/>
+          <p:nvPr/>
+        </p:nvSpPr>
+        <p:spPr>
+          <a:xfrm>
+            <a:off x="3549680" y="4982242"/>
+            <a:ext cx="290464" cy="323165"/>
+          </a:xfrm>
+          <a:prstGeom prst="rect">
+            <a:avLst/>
+          </a:prstGeom>
+        </p:spPr>
+        <p:style>
+          <a:lnRef idx="2">
+            <a:schemeClr val="accent4">
+              <a:shade val="15000"/>
+            </a:schemeClr>
+          </a:lnRef>
+          <a:fillRef idx="1">
+            <a:schemeClr val="accent4"/>
+          </a:fillRef>
+          <a:effectRef idx="0">
+            <a:schemeClr val="accent4"/>
+          </a:effectRef>
+          <a:fontRef idx="minor">
+            <a:schemeClr val="lt1"/>
+          </a:fontRef>
+        </p:style>
+        <p:txBody>
+          <a:bodyPr wrap="none" rtlCol="0">
+            <a:spAutoFit/>
+          </a:bodyPr>
+          <a:lstStyle/>
+          <a:p>
+            <a:r>
+              <a:rPr lang="en-US" altLang="ko-KR" sz="1500" dirty="0">
+                <a:solidFill>
+                  <a:schemeClr val="tx1"/>
+                </a:solidFill>
+              </a:rPr>
+              <a:t>6</a:t>
+            </a:r>
+            <a:endParaRPr lang="ko-KR" altLang="en-US" sz="1500" dirty="0">
+              <a:solidFill>
+                <a:schemeClr val="tx1"/>
+              </a:solidFill>
+            </a:endParaRPr>
+          </a:p>
+        </p:txBody>
+      </p:sp>
     </p:spTree>
     <p:extLst>
       <p:ext uri="{BB962C8B-B14F-4D97-AF65-F5344CB8AC3E}">

</xml_diff>

<commit_message>
Text Translate, Dash Deploy
</commit_message>
<xml_diff>
--- a/Final_pjt2/Infra_Pipeline.pptx
+++ b/Final_pjt2/Infra_Pipeline.pptx
@@ -261,7 +261,7 @@
           <a:p>
             <a:fld id="{F4D0D417-D880-4BB4-B0FA-3563BBBF0335}" type="datetimeFigureOut">
               <a:rPr lang="ko-KR" altLang="en-US" smtClean="0"/>
-              <a:t>2023-12-07</a:t>
+              <a:t>2023-12-08</a:t>
             </a:fld>
             <a:endParaRPr lang="ko-KR" altLang="en-US"/>
           </a:p>
@@ -459,7 +459,7 @@
           <a:p>
             <a:fld id="{F4D0D417-D880-4BB4-B0FA-3563BBBF0335}" type="datetimeFigureOut">
               <a:rPr lang="ko-KR" altLang="en-US" smtClean="0"/>
-              <a:t>2023-12-07</a:t>
+              <a:t>2023-12-08</a:t>
             </a:fld>
             <a:endParaRPr lang="ko-KR" altLang="en-US"/>
           </a:p>
@@ -667,7 +667,7 @@
           <a:p>
             <a:fld id="{F4D0D417-D880-4BB4-B0FA-3563BBBF0335}" type="datetimeFigureOut">
               <a:rPr lang="ko-KR" altLang="en-US" smtClean="0"/>
-              <a:t>2023-12-07</a:t>
+              <a:t>2023-12-08</a:t>
             </a:fld>
             <a:endParaRPr lang="ko-KR" altLang="en-US"/>
           </a:p>
@@ -865,7 +865,7 @@
           <a:p>
             <a:fld id="{F4D0D417-D880-4BB4-B0FA-3563BBBF0335}" type="datetimeFigureOut">
               <a:rPr lang="ko-KR" altLang="en-US" smtClean="0"/>
-              <a:t>2023-12-07</a:t>
+              <a:t>2023-12-08</a:t>
             </a:fld>
             <a:endParaRPr lang="ko-KR" altLang="en-US"/>
           </a:p>
@@ -1140,7 +1140,7 @@
           <a:p>
             <a:fld id="{F4D0D417-D880-4BB4-B0FA-3563BBBF0335}" type="datetimeFigureOut">
               <a:rPr lang="ko-KR" altLang="en-US" smtClean="0"/>
-              <a:t>2023-12-07</a:t>
+              <a:t>2023-12-08</a:t>
             </a:fld>
             <a:endParaRPr lang="ko-KR" altLang="en-US"/>
           </a:p>
@@ -1405,7 +1405,7 @@
           <a:p>
             <a:fld id="{F4D0D417-D880-4BB4-B0FA-3563BBBF0335}" type="datetimeFigureOut">
               <a:rPr lang="ko-KR" altLang="en-US" smtClean="0"/>
-              <a:t>2023-12-07</a:t>
+              <a:t>2023-12-08</a:t>
             </a:fld>
             <a:endParaRPr lang="ko-KR" altLang="en-US"/>
           </a:p>
@@ -1817,7 +1817,7 @@
           <a:p>
             <a:fld id="{F4D0D417-D880-4BB4-B0FA-3563BBBF0335}" type="datetimeFigureOut">
               <a:rPr lang="ko-KR" altLang="en-US" smtClean="0"/>
-              <a:t>2023-12-07</a:t>
+              <a:t>2023-12-08</a:t>
             </a:fld>
             <a:endParaRPr lang="ko-KR" altLang="en-US"/>
           </a:p>
@@ -1958,7 +1958,7 @@
           <a:p>
             <a:fld id="{F4D0D417-D880-4BB4-B0FA-3563BBBF0335}" type="datetimeFigureOut">
               <a:rPr lang="ko-KR" altLang="en-US" smtClean="0"/>
-              <a:t>2023-12-07</a:t>
+              <a:t>2023-12-08</a:t>
             </a:fld>
             <a:endParaRPr lang="ko-KR" altLang="en-US"/>
           </a:p>
@@ -2071,7 +2071,7 @@
           <a:p>
             <a:fld id="{F4D0D417-D880-4BB4-B0FA-3563BBBF0335}" type="datetimeFigureOut">
               <a:rPr lang="ko-KR" altLang="en-US" smtClean="0"/>
-              <a:t>2023-12-07</a:t>
+              <a:t>2023-12-08</a:t>
             </a:fld>
             <a:endParaRPr lang="ko-KR" altLang="en-US"/>
           </a:p>
@@ -2382,7 +2382,7 @@
           <a:p>
             <a:fld id="{F4D0D417-D880-4BB4-B0FA-3563BBBF0335}" type="datetimeFigureOut">
               <a:rPr lang="ko-KR" altLang="en-US" smtClean="0"/>
-              <a:t>2023-12-07</a:t>
+              <a:t>2023-12-08</a:t>
             </a:fld>
             <a:endParaRPr lang="ko-KR" altLang="en-US"/>
           </a:p>
@@ -2670,7 +2670,7 @@
           <a:p>
             <a:fld id="{F4D0D417-D880-4BB4-B0FA-3563BBBF0335}" type="datetimeFigureOut">
               <a:rPr lang="ko-KR" altLang="en-US" smtClean="0"/>
-              <a:t>2023-12-07</a:t>
+              <a:t>2023-12-08</a:t>
             </a:fld>
             <a:endParaRPr lang="ko-KR" altLang="en-US"/>
           </a:p>
@@ -2911,7 +2911,7 @@
           <a:p>
             <a:fld id="{F4D0D417-D880-4BB4-B0FA-3563BBBF0335}" type="datetimeFigureOut">
               <a:rPr lang="ko-KR" altLang="en-US" smtClean="0"/>
-              <a:t>2023-12-07</a:t>
+              <a:t>2023-12-08</a:t>
             </a:fld>
             <a:endParaRPr lang="ko-KR" altLang="en-US"/>
           </a:p>
@@ -11539,7 +11539,7 @@
                   <a:srgbClr val="ED7100"/>
                 </a:solidFill>
               </a:rPr>
-              <a:t>T2</a:t>
+              <a:t>T3</a:t>
             </a:r>
             <a:endParaRPr lang="ko-KR" altLang="en-US" sz="1500" b="1" dirty="0">
               <a:solidFill>

</xml_diff>